<commit_message>
Added Various Worked Example Videos
</commit_message>
<xml_diff>
--- a/Lecture Slides/VideoLectureSlides/4.3.pptx
+++ b/Lecture Slides/VideoLectureSlides/4.3.pptx
@@ -5,7 +5,7 @@
     <p:sldMasterId id="2147483660" r:id="rId4"/>
   </p:sldMasterIdLst>
   <p:notesMasterIdLst>
-    <p:notesMasterId r:id="rId15"/>
+    <p:notesMasterId r:id="rId18"/>
   </p:notesMasterIdLst>
   <p:sldIdLst>
     <p:sldId id="256" r:id="rId5"/>
@@ -18,6 +18,9 @@
     <p:sldId id="287" r:id="rId12"/>
     <p:sldId id="305" r:id="rId13"/>
     <p:sldId id="306" r:id="rId14"/>
+    <p:sldId id="307" r:id="rId15"/>
+    <p:sldId id="308" r:id="rId16"/>
+    <p:sldId id="309" r:id="rId17"/>
   </p:sldIdLst>
   <p:sldSz cx="9144000" cy="6858000" type="screen4x3"/>
   <p:notesSz cx="6858000" cy="9144000"/>
@@ -545,7 +548,7 @@
           <a:p>
             <a:fld id="{1AA1AB63-216F-4D5B-8811-CCB935E98D4A}" type="datetimeFigureOut">
               <a:rPr lang="en-US" smtClean="0"/>
-              <a:t>9/21/2020</a:t>
+              <a:t>11/7/2021</a:t>
             </a:fld>
             <a:endParaRPr lang="en-US"/>
           </a:p>
@@ -4085,7 +4088,7 @@
           <a:p>
             <a:r>
               <a:rPr lang="en-US" dirty="0"/>
-              <a:t>Equivalent Force Couple System Practice Problem</a:t>
+              <a:t>Equivalent Force Couple System Worked Example</a:t>
             </a:r>
           </a:p>
         </p:txBody>
@@ -4108,13 +4111,13 @@
         </p:spPr>
         <p:txBody>
           <a:bodyPr>
-            <a:normAutofit fontScale="92500"/>
+            <a:normAutofit/>
           </a:bodyPr>
           <a:lstStyle/>
           <a:p>
             <a:r>
               <a:rPr lang="en-US" dirty="0"/>
-              <a:t>Find the equivalent force couple system to the set of forces shown below about the center of mass.</a:t>
+              <a:t>Find the equivalent force couple system about point G for the set of forces shown below.</a:t>
             </a:r>
           </a:p>
           <a:p>
@@ -4514,7 +4517,7 @@
         <p:spPr>
           <a:xfrm>
             <a:off x="4789714" y="4419600"/>
-            <a:ext cx="662297" cy="369332"/>
+            <a:ext cx="332142" cy="369332"/>
           </a:xfrm>
           <a:prstGeom prst="rect">
             <a:avLst/>
@@ -4533,7 +4536,7 @@
                   <a:schemeClr val="bg1"/>
                 </a:solidFill>
               </a:rPr>
-              <a:t>COM</a:t>
+              <a:t>G</a:t>
             </a:r>
           </a:p>
         </p:txBody>
@@ -4926,6 +4929,2931 @@
     <p:extLst>
       <p:ext uri="{BB962C8B-B14F-4D97-AF65-F5344CB8AC3E}">
         <p14:creationId xmlns:p14="http://schemas.microsoft.com/office/powerpoint/2010/main" val="367277184"/>
+      </p:ext>
+    </p:extLst>
+  </p:cSld>
+  <p:clrMapOvr>
+    <a:masterClrMapping/>
+  </p:clrMapOvr>
+</p:sld>
+</file>
+
+<file path=ppt/slides/slide11.xml><?xml version="1.0" encoding="utf-8"?>
+<p:sld xmlns:a="http://schemas.openxmlformats.org/drawingml/2006/main" xmlns:r="http://schemas.openxmlformats.org/officeDocument/2006/relationships" xmlns:p="http://schemas.openxmlformats.org/presentationml/2006/main">
+  <p:cSld>
+    <p:spTree>
+      <p:nvGrpSpPr>
+        <p:cNvPr id="1" name=""/>
+        <p:cNvGrpSpPr/>
+        <p:nvPr/>
+      </p:nvGrpSpPr>
+      <p:grpSpPr>
+        <a:xfrm>
+          <a:off x="0" y="0"/>
+          <a:ext cx="0" cy="0"/>
+          <a:chOff x="0" y="0"/>
+          <a:chExt cx="0" cy="0"/>
+        </a:xfrm>
+      </p:grpSpPr>
+      <p:sp>
+        <p:nvSpPr>
+          <p:cNvPr id="2" name="Title 1"/>
+          <p:cNvSpPr>
+            <a:spLocks noGrp="1"/>
+          </p:cNvSpPr>
+          <p:nvPr>
+            <p:ph type="title"/>
+          </p:nvPr>
+        </p:nvSpPr>
+        <p:spPr/>
+        <p:txBody>
+          <a:bodyPr>
+            <a:normAutofit fontScale="90000"/>
+          </a:bodyPr>
+          <a:lstStyle/>
+          <a:p>
+            <a:r>
+              <a:rPr lang="en-US" dirty="0"/>
+              <a:t>Equivalent Force Couple System Worked Example</a:t>
+            </a:r>
+          </a:p>
+        </p:txBody>
+      </p:sp>
+      <p:pic>
+        <p:nvPicPr>
+          <p:cNvPr id="5" name="Picture 2" descr="http://9pixs.com/wp-content/uploads/2014/06/clip-art-car_1404139436.jpg"/>
+          <p:cNvPicPr>
+            <a:picLocks noChangeAspect="1" noChangeArrowheads="1"/>
+          </p:cNvPicPr>
+          <p:nvPr/>
+        </p:nvPicPr>
+        <p:blipFill>
+          <a:blip r:embed="rId2">
+            <a:extLst>
+              <a:ext uri="{28A0092B-C50C-407E-A947-70E740481C1C}">
+                <a14:useLocalDpi xmlns:a14="http://schemas.microsoft.com/office/drawing/2010/main" val="0"/>
+              </a:ext>
+            </a:extLst>
+          </a:blip>
+          <a:srcRect/>
+          <a:stretch>
+            <a:fillRect/>
+          </a:stretch>
+        </p:blipFill>
+        <p:spPr bwMode="auto">
+          <a:xfrm>
+            <a:off x="1676400" y="3733800"/>
+            <a:ext cx="5962650" cy="1962150"/>
+          </a:xfrm>
+          <a:prstGeom prst="rect">
+            <a:avLst/>
+          </a:prstGeom>
+          <a:noFill/>
+          <a:extLst>
+            <a:ext uri="{909E8E84-426E-40DD-AFC4-6F175D3DCCD1}">
+              <a14:hiddenFill xmlns:a14="http://schemas.microsoft.com/office/drawing/2010/main">
+                <a:solidFill>
+                  <a:srgbClr val="FFFFFF"/>
+                </a:solidFill>
+              </a14:hiddenFill>
+            </a:ext>
+          </a:extLst>
+        </p:spPr>
+      </p:pic>
+      <p:cxnSp>
+        <p:nvCxnSpPr>
+          <p:cNvPr id="6" name="Straight Arrow Connector 5"/>
+          <p:cNvCxnSpPr/>
+          <p:nvPr/>
+        </p:nvCxnSpPr>
+        <p:spPr>
+          <a:xfrm flipV="1">
+            <a:off x="3037114" y="5685064"/>
+            <a:ext cx="0" cy="802821"/>
+          </a:xfrm>
+          <a:prstGeom prst="straightConnector1">
+            <a:avLst/>
+          </a:prstGeom>
+          <a:ln>
+            <a:solidFill>
+              <a:srgbClr val="FF0000"/>
+            </a:solidFill>
+            <a:tailEnd type="arrow"/>
+          </a:ln>
+        </p:spPr>
+        <p:style>
+          <a:lnRef idx="3">
+            <a:schemeClr val="accent2"/>
+          </a:lnRef>
+          <a:fillRef idx="0">
+            <a:schemeClr val="accent2"/>
+          </a:fillRef>
+          <a:effectRef idx="2">
+            <a:schemeClr val="accent2"/>
+          </a:effectRef>
+          <a:fontRef idx="minor">
+            <a:schemeClr val="tx1"/>
+          </a:fontRef>
+        </p:style>
+      </p:cxnSp>
+      <p:sp>
+        <p:nvSpPr>
+          <p:cNvPr id="7" name="TextBox 6"/>
+          <p:cNvSpPr txBox="1"/>
+          <p:nvPr/>
+        </p:nvSpPr>
+        <p:spPr>
+          <a:xfrm>
+            <a:off x="2612572" y="6477782"/>
+            <a:ext cx="858377" cy="369332"/>
+          </a:xfrm>
+          <a:prstGeom prst="rect">
+            <a:avLst/>
+          </a:prstGeom>
+          <a:noFill/>
+        </p:spPr>
+        <p:txBody>
+          <a:bodyPr wrap="none" rtlCol="0">
+            <a:spAutoFit/>
+          </a:bodyPr>
+          <a:lstStyle/>
+          <a:p>
+            <a:r>
+              <a:rPr lang="en-US" b="1" dirty="0">
+                <a:solidFill>
+                  <a:srgbClr val="FF0000"/>
+                </a:solidFill>
+              </a:rPr>
+              <a:t>600 lbs</a:t>
+            </a:r>
+          </a:p>
+        </p:txBody>
+      </p:sp>
+      <p:cxnSp>
+        <p:nvCxnSpPr>
+          <p:cNvPr id="9" name="Straight Arrow Connector 8"/>
+          <p:cNvCxnSpPr/>
+          <p:nvPr/>
+        </p:nvCxnSpPr>
+        <p:spPr>
+          <a:xfrm flipV="1">
+            <a:off x="6498772" y="5653768"/>
+            <a:ext cx="0" cy="1051832"/>
+          </a:xfrm>
+          <a:prstGeom prst="straightConnector1">
+            <a:avLst/>
+          </a:prstGeom>
+          <a:ln>
+            <a:solidFill>
+              <a:srgbClr val="FF0000"/>
+            </a:solidFill>
+            <a:tailEnd type="arrow"/>
+          </a:ln>
+        </p:spPr>
+        <p:style>
+          <a:lnRef idx="3">
+            <a:schemeClr val="accent2"/>
+          </a:lnRef>
+          <a:fillRef idx="0">
+            <a:schemeClr val="accent2"/>
+          </a:fillRef>
+          <a:effectRef idx="2">
+            <a:schemeClr val="accent2"/>
+          </a:effectRef>
+          <a:fontRef idx="minor">
+            <a:schemeClr val="tx1"/>
+          </a:fontRef>
+        </p:style>
+      </p:cxnSp>
+      <p:sp>
+        <p:nvSpPr>
+          <p:cNvPr id="11" name="TextBox 10"/>
+          <p:cNvSpPr txBox="1"/>
+          <p:nvPr/>
+        </p:nvSpPr>
+        <p:spPr>
+          <a:xfrm>
+            <a:off x="5638800" y="6456010"/>
+            <a:ext cx="858377" cy="369332"/>
+          </a:xfrm>
+          <a:prstGeom prst="rect">
+            <a:avLst/>
+          </a:prstGeom>
+          <a:noFill/>
+        </p:spPr>
+        <p:txBody>
+          <a:bodyPr wrap="none" rtlCol="0">
+            <a:spAutoFit/>
+          </a:bodyPr>
+          <a:lstStyle/>
+          <a:p>
+            <a:r>
+              <a:rPr lang="en-US" b="1" dirty="0">
+                <a:solidFill>
+                  <a:srgbClr val="FF0000"/>
+                </a:solidFill>
+              </a:rPr>
+              <a:t>800 lbs</a:t>
+            </a:r>
+          </a:p>
+        </p:txBody>
+      </p:sp>
+      <p:cxnSp>
+        <p:nvCxnSpPr>
+          <p:cNvPr id="12" name="Straight Arrow Connector 11"/>
+          <p:cNvCxnSpPr/>
+          <p:nvPr/>
+        </p:nvCxnSpPr>
+        <p:spPr>
+          <a:xfrm flipH="1" flipV="1">
+            <a:off x="2743200" y="5696341"/>
+            <a:ext cx="293914" cy="1"/>
+          </a:xfrm>
+          <a:prstGeom prst="straightConnector1">
+            <a:avLst/>
+          </a:prstGeom>
+          <a:ln>
+            <a:solidFill>
+              <a:srgbClr val="FF0000"/>
+            </a:solidFill>
+            <a:tailEnd type="arrow"/>
+          </a:ln>
+        </p:spPr>
+        <p:style>
+          <a:lnRef idx="3">
+            <a:schemeClr val="accent2"/>
+          </a:lnRef>
+          <a:fillRef idx="0">
+            <a:schemeClr val="accent2"/>
+          </a:fillRef>
+          <a:effectRef idx="2">
+            <a:schemeClr val="accent2"/>
+          </a:effectRef>
+          <a:fontRef idx="minor">
+            <a:schemeClr val="tx1"/>
+          </a:fontRef>
+        </p:style>
+      </p:cxnSp>
+      <p:cxnSp>
+        <p:nvCxnSpPr>
+          <p:cNvPr id="14" name="Straight Arrow Connector 13"/>
+          <p:cNvCxnSpPr/>
+          <p:nvPr/>
+        </p:nvCxnSpPr>
+        <p:spPr>
+          <a:xfrm flipH="1" flipV="1">
+            <a:off x="5791200" y="5649686"/>
+            <a:ext cx="696686" cy="2"/>
+          </a:xfrm>
+          <a:prstGeom prst="straightConnector1">
+            <a:avLst/>
+          </a:prstGeom>
+          <a:ln>
+            <a:solidFill>
+              <a:srgbClr val="FF0000"/>
+            </a:solidFill>
+            <a:tailEnd type="arrow"/>
+          </a:ln>
+        </p:spPr>
+        <p:style>
+          <a:lnRef idx="3">
+            <a:schemeClr val="accent2"/>
+          </a:lnRef>
+          <a:fillRef idx="0">
+            <a:schemeClr val="accent2"/>
+          </a:fillRef>
+          <a:effectRef idx="2">
+            <a:schemeClr val="accent2"/>
+          </a:effectRef>
+          <a:fontRef idx="minor">
+            <a:schemeClr val="tx1"/>
+          </a:fontRef>
+        </p:style>
+      </p:cxnSp>
+      <p:sp>
+        <p:nvSpPr>
+          <p:cNvPr id="16" name="TextBox 15"/>
+          <p:cNvSpPr txBox="1"/>
+          <p:nvPr/>
+        </p:nvSpPr>
+        <p:spPr>
+          <a:xfrm>
+            <a:off x="2001843" y="5498068"/>
+            <a:ext cx="741357" cy="369332"/>
+          </a:xfrm>
+          <a:prstGeom prst="rect">
+            <a:avLst/>
+          </a:prstGeom>
+          <a:noFill/>
+        </p:spPr>
+        <p:txBody>
+          <a:bodyPr wrap="none" rtlCol="0">
+            <a:spAutoFit/>
+          </a:bodyPr>
+          <a:lstStyle/>
+          <a:p>
+            <a:r>
+              <a:rPr lang="en-US" b="1" dirty="0">
+                <a:solidFill>
+                  <a:srgbClr val="FF0000"/>
+                </a:solidFill>
+              </a:rPr>
+              <a:t>30 lbs</a:t>
+            </a:r>
+          </a:p>
+        </p:txBody>
+      </p:sp>
+      <p:sp>
+        <p:nvSpPr>
+          <p:cNvPr id="17" name="TextBox 16"/>
+          <p:cNvSpPr txBox="1"/>
+          <p:nvPr/>
+        </p:nvSpPr>
+        <p:spPr>
+          <a:xfrm>
+            <a:off x="5009023" y="5486400"/>
+            <a:ext cx="741357" cy="369332"/>
+          </a:xfrm>
+          <a:prstGeom prst="rect">
+            <a:avLst/>
+          </a:prstGeom>
+          <a:noFill/>
+        </p:spPr>
+        <p:txBody>
+          <a:bodyPr wrap="none" rtlCol="0">
+            <a:spAutoFit/>
+          </a:bodyPr>
+          <a:lstStyle/>
+          <a:p>
+            <a:r>
+              <a:rPr lang="en-US" b="1" dirty="0">
+                <a:solidFill>
+                  <a:srgbClr val="FF0000"/>
+                </a:solidFill>
+              </a:rPr>
+              <a:t>50 lbs</a:t>
+            </a:r>
+          </a:p>
+        </p:txBody>
+      </p:sp>
+      <p:sp>
+        <p:nvSpPr>
+          <p:cNvPr id="18" name="Oval 17"/>
+          <p:cNvSpPr/>
+          <p:nvPr/>
+        </p:nvSpPr>
+        <p:spPr>
+          <a:xfrm>
+            <a:off x="4785360" y="4712732"/>
+            <a:ext cx="91440" cy="87868"/>
+          </a:xfrm>
+          <a:prstGeom prst="ellipse">
+            <a:avLst/>
+          </a:prstGeom>
+          <a:solidFill>
+            <a:schemeClr val="bg1"/>
+          </a:solidFill>
+        </p:spPr>
+        <p:style>
+          <a:lnRef idx="2">
+            <a:schemeClr val="dk1">
+              <a:shade val="50000"/>
+            </a:schemeClr>
+          </a:lnRef>
+          <a:fillRef idx="1">
+            <a:schemeClr val="dk1"/>
+          </a:fillRef>
+          <a:effectRef idx="0">
+            <a:schemeClr val="dk1"/>
+          </a:effectRef>
+          <a:fontRef idx="minor">
+            <a:schemeClr val="lt1"/>
+          </a:fontRef>
+        </p:style>
+        <p:txBody>
+          <a:bodyPr rtlCol="0" anchor="ctr"/>
+          <a:lstStyle/>
+          <a:p>
+            <a:pPr algn="ctr"/>
+            <a:endParaRPr lang="en-US"/>
+          </a:p>
+        </p:txBody>
+      </p:sp>
+      <p:sp>
+        <p:nvSpPr>
+          <p:cNvPr id="19" name="TextBox 18"/>
+          <p:cNvSpPr txBox="1"/>
+          <p:nvPr/>
+        </p:nvSpPr>
+        <p:spPr>
+          <a:xfrm>
+            <a:off x="4789714" y="4419600"/>
+            <a:ext cx="332142" cy="369332"/>
+          </a:xfrm>
+          <a:prstGeom prst="rect">
+            <a:avLst/>
+          </a:prstGeom>
+          <a:noFill/>
+        </p:spPr>
+        <p:txBody>
+          <a:bodyPr wrap="none" rtlCol="0">
+            <a:spAutoFit/>
+          </a:bodyPr>
+          <a:lstStyle/>
+          <a:p>
+            <a:r>
+              <a:rPr lang="en-US" b="1" dirty="0">
+                <a:solidFill>
+                  <a:schemeClr val="bg1"/>
+                </a:solidFill>
+              </a:rPr>
+              <a:t>G</a:t>
+            </a:r>
+          </a:p>
+        </p:txBody>
+      </p:sp>
+      <p:cxnSp>
+        <p:nvCxnSpPr>
+          <p:cNvPr id="20" name="Straight Connector 19"/>
+          <p:cNvCxnSpPr/>
+          <p:nvPr/>
+        </p:nvCxnSpPr>
+        <p:spPr>
+          <a:xfrm flipV="1">
+            <a:off x="3041760" y="3048000"/>
+            <a:ext cx="0" cy="2541428"/>
+          </a:xfrm>
+          <a:prstGeom prst="line">
+            <a:avLst/>
+          </a:prstGeom>
+        </p:spPr>
+        <p:style>
+          <a:lnRef idx="1">
+            <a:schemeClr val="accent1"/>
+          </a:lnRef>
+          <a:fillRef idx="0">
+            <a:schemeClr val="accent1"/>
+          </a:fillRef>
+          <a:effectRef idx="0">
+            <a:schemeClr val="accent1"/>
+          </a:effectRef>
+          <a:fontRef idx="minor">
+            <a:schemeClr val="tx1"/>
+          </a:fontRef>
+        </p:style>
+      </p:cxnSp>
+      <p:cxnSp>
+        <p:nvCxnSpPr>
+          <p:cNvPr id="24" name="Straight Connector 23"/>
+          <p:cNvCxnSpPr/>
+          <p:nvPr/>
+        </p:nvCxnSpPr>
+        <p:spPr>
+          <a:xfrm flipV="1">
+            <a:off x="6509658" y="2993572"/>
+            <a:ext cx="0" cy="2541428"/>
+          </a:xfrm>
+          <a:prstGeom prst="line">
+            <a:avLst/>
+          </a:prstGeom>
+        </p:spPr>
+        <p:style>
+          <a:lnRef idx="1">
+            <a:schemeClr val="accent1"/>
+          </a:lnRef>
+          <a:fillRef idx="0">
+            <a:schemeClr val="accent1"/>
+          </a:fillRef>
+          <a:effectRef idx="0">
+            <a:schemeClr val="accent1"/>
+          </a:effectRef>
+          <a:fontRef idx="minor">
+            <a:schemeClr val="tx1"/>
+          </a:fontRef>
+        </p:style>
+      </p:cxnSp>
+      <p:cxnSp>
+        <p:nvCxnSpPr>
+          <p:cNvPr id="25" name="Straight Connector 24"/>
+          <p:cNvCxnSpPr/>
+          <p:nvPr/>
+        </p:nvCxnSpPr>
+        <p:spPr>
+          <a:xfrm flipV="1">
+            <a:off x="4831080" y="3048000"/>
+            <a:ext cx="0" cy="1600200"/>
+          </a:xfrm>
+          <a:prstGeom prst="line">
+            <a:avLst/>
+          </a:prstGeom>
+        </p:spPr>
+        <p:style>
+          <a:lnRef idx="1">
+            <a:schemeClr val="accent1"/>
+          </a:lnRef>
+          <a:fillRef idx="0">
+            <a:schemeClr val="accent1"/>
+          </a:fillRef>
+          <a:effectRef idx="0">
+            <a:schemeClr val="accent1"/>
+          </a:effectRef>
+          <a:fontRef idx="minor">
+            <a:schemeClr val="tx1"/>
+          </a:fontRef>
+        </p:style>
+      </p:cxnSp>
+      <p:cxnSp>
+        <p:nvCxnSpPr>
+          <p:cNvPr id="28" name="Straight Connector 27"/>
+          <p:cNvCxnSpPr/>
+          <p:nvPr/>
+        </p:nvCxnSpPr>
+        <p:spPr>
+          <a:xfrm>
+            <a:off x="3037114" y="3276600"/>
+            <a:ext cx="3472544" cy="0"/>
+          </a:xfrm>
+          <a:prstGeom prst="line">
+            <a:avLst/>
+          </a:prstGeom>
+        </p:spPr>
+        <p:style>
+          <a:lnRef idx="1">
+            <a:schemeClr val="accent1"/>
+          </a:lnRef>
+          <a:fillRef idx="0">
+            <a:schemeClr val="accent1"/>
+          </a:fillRef>
+          <a:effectRef idx="0">
+            <a:schemeClr val="accent1"/>
+          </a:effectRef>
+          <a:fontRef idx="minor">
+            <a:schemeClr val="tx1"/>
+          </a:fontRef>
+        </p:style>
+      </p:cxnSp>
+      <p:cxnSp>
+        <p:nvCxnSpPr>
+          <p:cNvPr id="31" name="Straight Connector 30"/>
+          <p:cNvCxnSpPr/>
+          <p:nvPr/>
+        </p:nvCxnSpPr>
+        <p:spPr>
+          <a:xfrm flipV="1">
+            <a:off x="4953000" y="4756666"/>
+            <a:ext cx="3581398" cy="392"/>
+          </a:xfrm>
+          <a:prstGeom prst="line">
+            <a:avLst/>
+          </a:prstGeom>
+        </p:spPr>
+        <p:style>
+          <a:lnRef idx="1">
+            <a:schemeClr val="accent1"/>
+          </a:lnRef>
+          <a:fillRef idx="0">
+            <a:schemeClr val="accent1"/>
+          </a:fillRef>
+          <a:effectRef idx="0">
+            <a:schemeClr val="accent1"/>
+          </a:effectRef>
+          <a:fontRef idx="minor">
+            <a:schemeClr val="tx1"/>
+          </a:fontRef>
+        </p:style>
+      </p:cxnSp>
+      <p:cxnSp>
+        <p:nvCxnSpPr>
+          <p:cNvPr id="34" name="Straight Connector 33"/>
+          <p:cNvCxnSpPr/>
+          <p:nvPr/>
+        </p:nvCxnSpPr>
+        <p:spPr>
+          <a:xfrm flipV="1">
+            <a:off x="6629398" y="5660178"/>
+            <a:ext cx="1905000" cy="392"/>
+          </a:xfrm>
+          <a:prstGeom prst="line">
+            <a:avLst/>
+          </a:prstGeom>
+        </p:spPr>
+        <p:style>
+          <a:lnRef idx="1">
+            <a:schemeClr val="accent1"/>
+          </a:lnRef>
+          <a:fillRef idx="0">
+            <a:schemeClr val="accent1"/>
+          </a:fillRef>
+          <a:effectRef idx="0">
+            <a:schemeClr val="accent1"/>
+          </a:effectRef>
+          <a:fontRef idx="minor">
+            <a:schemeClr val="tx1"/>
+          </a:fontRef>
+        </p:style>
+      </p:cxnSp>
+      <p:cxnSp>
+        <p:nvCxnSpPr>
+          <p:cNvPr id="37" name="Straight Connector 36"/>
+          <p:cNvCxnSpPr/>
+          <p:nvPr/>
+        </p:nvCxnSpPr>
+        <p:spPr>
+          <a:xfrm flipV="1">
+            <a:off x="8153400" y="4788932"/>
+            <a:ext cx="0" cy="871638"/>
+          </a:xfrm>
+          <a:prstGeom prst="line">
+            <a:avLst/>
+          </a:prstGeom>
+        </p:spPr>
+        <p:style>
+          <a:lnRef idx="1">
+            <a:schemeClr val="accent1"/>
+          </a:lnRef>
+          <a:fillRef idx="0">
+            <a:schemeClr val="accent1"/>
+          </a:fillRef>
+          <a:effectRef idx="0">
+            <a:schemeClr val="accent1"/>
+          </a:effectRef>
+          <a:fontRef idx="minor">
+            <a:schemeClr val="tx1"/>
+          </a:fontRef>
+        </p:style>
+      </p:cxnSp>
+      <p:sp>
+        <p:nvSpPr>
+          <p:cNvPr id="21" name="TextBox 20"/>
+          <p:cNvSpPr txBox="1"/>
+          <p:nvPr/>
+        </p:nvSpPr>
+        <p:spPr>
+          <a:xfrm>
+            <a:off x="3810000" y="3091934"/>
+            <a:ext cx="502061" cy="369332"/>
+          </a:xfrm>
+          <a:prstGeom prst="rect">
+            <a:avLst/>
+          </a:prstGeom>
+          <a:solidFill>
+            <a:schemeClr val="bg1"/>
+          </a:solidFill>
+        </p:spPr>
+        <p:txBody>
+          <a:bodyPr wrap="none" rtlCol="0">
+            <a:spAutoFit/>
+          </a:bodyPr>
+          <a:lstStyle/>
+          <a:p>
+            <a:r>
+              <a:rPr lang="en-US" dirty="0">
+                <a:solidFill>
+                  <a:schemeClr val="accent1"/>
+                </a:solidFill>
+              </a:rPr>
+              <a:t>5 ft</a:t>
+            </a:r>
+          </a:p>
+        </p:txBody>
+      </p:sp>
+      <p:sp>
+        <p:nvSpPr>
+          <p:cNvPr id="40" name="TextBox 39"/>
+          <p:cNvSpPr txBox="1"/>
+          <p:nvPr/>
+        </p:nvSpPr>
+        <p:spPr>
+          <a:xfrm>
+            <a:off x="5410200" y="3092326"/>
+            <a:ext cx="502061" cy="369332"/>
+          </a:xfrm>
+          <a:prstGeom prst="rect">
+            <a:avLst/>
+          </a:prstGeom>
+          <a:solidFill>
+            <a:schemeClr val="bg1"/>
+          </a:solidFill>
+        </p:spPr>
+        <p:txBody>
+          <a:bodyPr wrap="none" rtlCol="0">
+            <a:spAutoFit/>
+          </a:bodyPr>
+          <a:lstStyle/>
+          <a:p>
+            <a:r>
+              <a:rPr lang="en-US" dirty="0">
+                <a:solidFill>
+                  <a:schemeClr val="accent1"/>
+                </a:solidFill>
+              </a:rPr>
+              <a:t>4 ft</a:t>
+            </a:r>
+          </a:p>
+        </p:txBody>
+      </p:sp>
+      <p:sp>
+        <p:nvSpPr>
+          <p:cNvPr id="41" name="TextBox 40"/>
+          <p:cNvSpPr txBox="1"/>
+          <p:nvPr/>
+        </p:nvSpPr>
+        <p:spPr>
+          <a:xfrm>
+            <a:off x="7815944" y="5029982"/>
+            <a:ext cx="676788" cy="369332"/>
+          </a:xfrm>
+          <a:prstGeom prst="rect">
+            <a:avLst/>
+          </a:prstGeom>
+          <a:solidFill>
+            <a:schemeClr val="bg1"/>
+          </a:solidFill>
+        </p:spPr>
+        <p:txBody>
+          <a:bodyPr wrap="none" rtlCol="0">
+            <a:spAutoFit/>
+          </a:bodyPr>
+          <a:lstStyle/>
+          <a:p>
+            <a:r>
+              <a:rPr lang="en-US" dirty="0">
+                <a:solidFill>
+                  <a:schemeClr val="accent1"/>
+                </a:solidFill>
+              </a:rPr>
+              <a:t>2.5 ft</a:t>
+            </a:r>
+          </a:p>
+        </p:txBody>
+      </p:sp>
+      <p:cxnSp>
+        <p:nvCxnSpPr>
+          <p:cNvPr id="26" name="Straight Arrow Connector 25"/>
+          <p:cNvCxnSpPr/>
+          <p:nvPr/>
+        </p:nvCxnSpPr>
+        <p:spPr>
+          <a:xfrm>
+            <a:off x="4831080" y="4800600"/>
+            <a:ext cx="0" cy="1447800"/>
+          </a:xfrm>
+          <a:prstGeom prst="straightConnector1">
+            <a:avLst/>
+          </a:prstGeom>
+          <a:ln>
+            <a:solidFill>
+              <a:srgbClr val="FF0000"/>
+            </a:solidFill>
+            <a:tailEnd type="arrow"/>
+          </a:ln>
+        </p:spPr>
+        <p:style>
+          <a:lnRef idx="3">
+            <a:schemeClr val="accent2"/>
+          </a:lnRef>
+          <a:fillRef idx="0">
+            <a:schemeClr val="accent2"/>
+          </a:fillRef>
+          <a:effectRef idx="2">
+            <a:schemeClr val="accent2"/>
+          </a:effectRef>
+          <a:fontRef idx="minor">
+            <a:schemeClr val="tx1"/>
+          </a:fontRef>
+        </p:style>
+      </p:cxnSp>
+      <p:sp>
+        <p:nvSpPr>
+          <p:cNvPr id="29" name="TextBox 28"/>
+          <p:cNvSpPr txBox="1"/>
+          <p:nvPr/>
+        </p:nvSpPr>
+        <p:spPr>
+          <a:xfrm>
+            <a:off x="4347719" y="6249182"/>
+            <a:ext cx="975395" cy="369332"/>
+          </a:xfrm>
+          <a:prstGeom prst="rect">
+            <a:avLst/>
+          </a:prstGeom>
+          <a:noFill/>
+        </p:spPr>
+        <p:txBody>
+          <a:bodyPr wrap="none" rtlCol="0">
+            <a:spAutoFit/>
+          </a:bodyPr>
+          <a:lstStyle/>
+          <a:p>
+            <a:r>
+              <a:rPr lang="en-US" b="1" dirty="0">
+                <a:solidFill>
+                  <a:srgbClr val="FF0000"/>
+                </a:solidFill>
+              </a:rPr>
+              <a:t>1400 lbs</a:t>
+            </a:r>
+          </a:p>
+        </p:txBody>
+      </p:sp>
+    </p:spTree>
+    <p:extLst>
+      <p:ext uri="{BB962C8B-B14F-4D97-AF65-F5344CB8AC3E}">
+        <p14:creationId xmlns:p14="http://schemas.microsoft.com/office/powerpoint/2010/main" val="2700667407"/>
+      </p:ext>
+    </p:extLst>
+  </p:cSld>
+  <p:clrMapOvr>
+    <a:masterClrMapping/>
+  </p:clrMapOvr>
+</p:sld>
+</file>
+
+<file path=ppt/slides/slide12.xml><?xml version="1.0" encoding="utf-8"?>
+<p:sld xmlns:a="http://schemas.openxmlformats.org/drawingml/2006/main" xmlns:r="http://schemas.openxmlformats.org/officeDocument/2006/relationships" xmlns:p="http://schemas.openxmlformats.org/presentationml/2006/main">
+  <p:cSld>
+    <p:spTree>
+      <p:nvGrpSpPr>
+        <p:cNvPr id="1" name=""/>
+        <p:cNvGrpSpPr/>
+        <p:nvPr/>
+      </p:nvGrpSpPr>
+      <p:grpSpPr>
+        <a:xfrm>
+          <a:off x="0" y="0"/>
+          <a:ext cx="0" cy="0"/>
+          <a:chOff x="0" y="0"/>
+          <a:chExt cx="0" cy="0"/>
+        </a:xfrm>
+      </p:grpSpPr>
+      <p:sp>
+        <p:nvSpPr>
+          <p:cNvPr id="2" name="Title 1">
+            <a:extLst>
+              <a:ext uri="{FF2B5EF4-FFF2-40B4-BE49-F238E27FC236}">
+                <a16:creationId xmlns:a16="http://schemas.microsoft.com/office/drawing/2014/main" id="{AF0DF203-D667-4B8A-8A2D-DC54926E82B5}"/>
+              </a:ext>
+            </a:extLst>
+          </p:cNvPr>
+          <p:cNvSpPr>
+            <a:spLocks noGrp="1"/>
+          </p:cNvSpPr>
+          <p:nvPr>
+            <p:ph type="title"/>
+          </p:nvPr>
+        </p:nvSpPr>
+        <p:spPr/>
+        <p:txBody>
+          <a:bodyPr>
+            <a:normAutofit fontScale="90000"/>
+          </a:bodyPr>
+          <a:lstStyle/>
+          <a:p>
+            <a:r>
+              <a:rPr lang="en-US" dirty="0"/>
+              <a:t>Equivalent Force Couple System Worked Example</a:t>
+            </a:r>
+          </a:p>
+        </p:txBody>
+      </p:sp>
+      <p:sp>
+        <p:nvSpPr>
+          <p:cNvPr id="3" name="Content Placeholder 2">
+            <a:extLst>
+              <a:ext uri="{FF2B5EF4-FFF2-40B4-BE49-F238E27FC236}">
+                <a16:creationId xmlns:a16="http://schemas.microsoft.com/office/drawing/2014/main" id="{5302CD96-594E-46A6-A02C-1874FDFFF129}"/>
+              </a:ext>
+            </a:extLst>
+          </p:cNvPr>
+          <p:cNvSpPr>
+            <a:spLocks noGrp="1"/>
+          </p:cNvSpPr>
+          <p:nvPr>
+            <p:ph idx="1"/>
+          </p:nvPr>
+        </p:nvSpPr>
+        <p:spPr>
+          <a:xfrm>
+            <a:off x="457200" y="1600200"/>
+            <a:ext cx="3352800" cy="4756149"/>
+          </a:xfrm>
+        </p:spPr>
+        <p:txBody>
+          <a:bodyPr>
+            <a:normAutofit fontScale="85000" lnSpcReduction="10000"/>
+          </a:bodyPr>
+          <a:lstStyle/>
+          <a:p>
+            <a:r>
+              <a:rPr lang="en-US" dirty="0"/>
+              <a:t>An engine on an airplane fails mid-flight. The pilot tries to compensate using the rudder at the back of the tail. Find the equivalent force couple system about point G for the set of forces shown on the plane.</a:t>
+            </a:r>
+          </a:p>
+          <a:p>
+            <a:endParaRPr lang="en-US" dirty="0"/>
+          </a:p>
+        </p:txBody>
+      </p:sp>
+      <p:sp>
+        <p:nvSpPr>
+          <p:cNvPr id="4" name="Slide Number Placeholder 3">
+            <a:extLst>
+              <a:ext uri="{FF2B5EF4-FFF2-40B4-BE49-F238E27FC236}">
+                <a16:creationId xmlns:a16="http://schemas.microsoft.com/office/drawing/2014/main" id="{B8EC392D-9059-40C6-8F8F-B409380126A0}"/>
+              </a:ext>
+            </a:extLst>
+          </p:cNvPr>
+          <p:cNvSpPr>
+            <a:spLocks noGrp="1"/>
+          </p:cNvSpPr>
+          <p:nvPr>
+            <p:ph type="sldNum" sz="quarter" idx="12"/>
+          </p:nvPr>
+        </p:nvSpPr>
+        <p:spPr/>
+        <p:txBody>
+          <a:bodyPr/>
+          <a:lstStyle/>
+          <a:p>
+            <a:fld id="{929262FE-7F58-4A1E-8AF3-5A510A86DEBD}" type="slidenum">
+              <a:rPr lang="en-US" smtClean="0"/>
+              <a:t>12</a:t>
+            </a:fld>
+            <a:endParaRPr lang="en-US"/>
+          </a:p>
+        </p:txBody>
+      </p:sp>
+      <p:pic>
+        <p:nvPicPr>
+          <p:cNvPr id="1026" name="Picture 2" descr="Jet, Plane, Airline, Airliner, Airplane, Aeroplane">
+            <a:extLst>
+              <a:ext uri="{FF2B5EF4-FFF2-40B4-BE49-F238E27FC236}">
+                <a16:creationId xmlns:a16="http://schemas.microsoft.com/office/drawing/2014/main" id="{4F8CE84E-08CE-40D0-ADC2-A16A68B3C85D}"/>
+              </a:ext>
+            </a:extLst>
+          </p:cNvPr>
+          <p:cNvPicPr>
+            <a:picLocks noChangeAspect="1" noChangeArrowheads="1"/>
+          </p:cNvPicPr>
+          <p:nvPr/>
+        </p:nvPicPr>
+        <p:blipFill>
+          <a:blip r:embed="rId2">
+            <a:extLst>
+              <a:ext uri="{28A0092B-C50C-407E-A947-70E740481C1C}">
+                <a14:useLocalDpi xmlns:a14="http://schemas.microsoft.com/office/drawing/2010/main" val="0"/>
+              </a:ext>
+            </a:extLst>
+          </a:blip>
+          <a:srcRect/>
+          <a:stretch>
+            <a:fillRect/>
+          </a:stretch>
+        </p:blipFill>
+        <p:spPr bwMode="auto">
+          <a:xfrm>
+            <a:off x="4876800" y="2590800"/>
+            <a:ext cx="3123777" cy="3581400"/>
+          </a:xfrm>
+          <a:prstGeom prst="rect">
+            <a:avLst/>
+          </a:prstGeom>
+          <a:noFill/>
+          <a:extLst>
+            <a:ext uri="{909E8E84-426E-40DD-AFC4-6F175D3DCCD1}">
+              <a14:hiddenFill xmlns:a14="http://schemas.microsoft.com/office/drawing/2010/main">
+                <a:solidFill>
+                  <a:srgbClr val="FFFFFF"/>
+                </a:solidFill>
+              </a14:hiddenFill>
+            </a:ext>
+          </a:extLst>
+        </p:spPr>
+      </p:pic>
+      <p:sp>
+        <p:nvSpPr>
+          <p:cNvPr id="6" name="Oval 5">
+            <a:extLst>
+              <a:ext uri="{FF2B5EF4-FFF2-40B4-BE49-F238E27FC236}">
+                <a16:creationId xmlns:a16="http://schemas.microsoft.com/office/drawing/2014/main" id="{3FBBA8E5-E33A-404E-88F0-B2E9B2EDA30F}"/>
+              </a:ext>
+            </a:extLst>
+          </p:cNvPr>
+          <p:cNvSpPr/>
+          <p:nvPr/>
+        </p:nvSpPr>
+        <p:spPr>
+          <a:xfrm>
+            <a:off x="6397679" y="4188063"/>
+            <a:ext cx="91440" cy="87868"/>
+          </a:xfrm>
+          <a:prstGeom prst="ellipse">
+            <a:avLst/>
+          </a:prstGeom>
+          <a:solidFill>
+            <a:schemeClr val="bg1"/>
+          </a:solidFill>
+        </p:spPr>
+        <p:style>
+          <a:lnRef idx="2">
+            <a:schemeClr val="dk1">
+              <a:shade val="50000"/>
+            </a:schemeClr>
+          </a:lnRef>
+          <a:fillRef idx="1">
+            <a:schemeClr val="dk1"/>
+          </a:fillRef>
+          <a:effectRef idx="0">
+            <a:schemeClr val="dk1"/>
+          </a:effectRef>
+          <a:fontRef idx="minor">
+            <a:schemeClr val="lt1"/>
+          </a:fontRef>
+        </p:style>
+        <p:txBody>
+          <a:bodyPr rtlCol="0" anchor="ctr"/>
+          <a:lstStyle/>
+          <a:p>
+            <a:pPr algn="ctr"/>
+            <a:endParaRPr lang="en-US"/>
+          </a:p>
+        </p:txBody>
+      </p:sp>
+      <p:sp>
+        <p:nvSpPr>
+          <p:cNvPr id="7" name="TextBox 6">
+            <a:extLst>
+              <a:ext uri="{FF2B5EF4-FFF2-40B4-BE49-F238E27FC236}">
+                <a16:creationId xmlns:a16="http://schemas.microsoft.com/office/drawing/2014/main" id="{5C896006-B35D-4171-B503-225FE4C37756}"/>
+              </a:ext>
+            </a:extLst>
+          </p:cNvPr>
+          <p:cNvSpPr txBox="1"/>
+          <p:nvPr/>
+        </p:nvSpPr>
+        <p:spPr>
+          <a:xfrm>
+            <a:off x="6096000" y="3896689"/>
+            <a:ext cx="332142" cy="369332"/>
+          </a:xfrm>
+          <a:prstGeom prst="rect">
+            <a:avLst/>
+          </a:prstGeom>
+          <a:noFill/>
+        </p:spPr>
+        <p:txBody>
+          <a:bodyPr wrap="none" rtlCol="0">
+            <a:spAutoFit/>
+          </a:bodyPr>
+          <a:lstStyle/>
+          <a:p>
+            <a:r>
+              <a:rPr lang="en-US" b="1" dirty="0">
+                <a:solidFill>
+                  <a:schemeClr val="bg1"/>
+                </a:solidFill>
+              </a:rPr>
+              <a:t>G</a:t>
+            </a:r>
+          </a:p>
+        </p:txBody>
+      </p:sp>
+      <p:cxnSp>
+        <p:nvCxnSpPr>
+          <p:cNvPr id="10" name="Straight Arrow Connector 9">
+            <a:extLst>
+              <a:ext uri="{FF2B5EF4-FFF2-40B4-BE49-F238E27FC236}">
+                <a16:creationId xmlns:a16="http://schemas.microsoft.com/office/drawing/2014/main" id="{76E6C61A-B3BD-424B-8773-E0BA2E09DCF2}"/>
+              </a:ext>
+            </a:extLst>
+          </p:cNvPr>
+          <p:cNvCxnSpPr>
+            <a:cxnSpLocks/>
+          </p:cNvCxnSpPr>
+          <p:nvPr/>
+        </p:nvCxnSpPr>
+        <p:spPr>
+          <a:xfrm flipV="1">
+            <a:off x="5305425" y="3580606"/>
+            <a:ext cx="0" cy="632166"/>
+          </a:xfrm>
+          <a:prstGeom prst="straightConnector1">
+            <a:avLst/>
+          </a:prstGeom>
+          <a:ln>
+            <a:solidFill>
+              <a:srgbClr val="FF0000"/>
+            </a:solidFill>
+            <a:tailEnd type="arrow"/>
+          </a:ln>
+        </p:spPr>
+        <p:style>
+          <a:lnRef idx="3">
+            <a:schemeClr val="accent2"/>
+          </a:lnRef>
+          <a:fillRef idx="0">
+            <a:schemeClr val="accent2"/>
+          </a:fillRef>
+          <a:effectRef idx="2">
+            <a:schemeClr val="accent2"/>
+          </a:effectRef>
+          <a:fontRef idx="minor">
+            <a:schemeClr val="tx1"/>
+          </a:fontRef>
+        </p:style>
+      </p:cxnSp>
+      <p:sp>
+        <p:nvSpPr>
+          <p:cNvPr id="11" name="TextBox 10">
+            <a:extLst>
+              <a:ext uri="{FF2B5EF4-FFF2-40B4-BE49-F238E27FC236}">
+                <a16:creationId xmlns:a16="http://schemas.microsoft.com/office/drawing/2014/main" id="{C167EDF4-5AFB-4E1D-ADA6-C0E239E857BA}"/>
+              </a:ext>
+            </a:extLst>
+          </p:cNvPr>
+          <p:cNvSpPr txBox="1"/>
+          <p:nvPr/>
+        </p:nvSpPr>
+        <p:spPr>
+          <a:xfrm>
+            <a:off x="4971515" y="3211274"/>
+            <a:ext cx="734496" cy="369332"/>
+          </a:xfrm>
+          <a:prstGeom prst="rect">
+            <a:avLst/>
+          </a:prstGeom>
+          <a:noFill/>
+        </p:spPr>
+        <p:txBody>
+          <a:bodyPr wrap="none" rtlCol="0">
+            <a:spAutoFit/>
+          </a:bodyPr>
+          <a:lstStyle/>
+          <a:p>
+            <a:r>
+              <a:rPr lang="en-US" b="1" dirty="0">
+                <a:solidFill>
+                  <a:srgbClr val="FF0000"/>
+                </a:solidFill>
+              </a:rPr>
+              <a:t>50 kN</a:t>
+            </a:r>
+          </a:p>
+        </p:txBody>
+      </p:sp>
+      <p:cxnSp>
+        <p:nvCxnSpPr>
+          <p:cNvPr id="13" name="Straight Arrow Connector 12">
+            <a:extLst>
+              <a:ext uri="{FF2B5EF4-FFF2-40B4-BE49-F238E27FC236}">
+                <a16:creationId xmlns:a16="http://schemas.microsoft.com/office/drawing/2014/main" id="{4FDE7519-CD29-4EDC-927A-D54840D5AC93}"/>
+              </a:ext>
+            </a:extLst>
+          </p:cNvPr>
+          <p:cNvCxnSpPr>
+            <a:cxnSpLocks/>
+          </p:cNvCxnSpPr>
+          <p:nvPr/>
+        </p:nvCxnSpPr>
+        <p:spPr>
+          <a:xfrm flipV="1">
+            <a:off x="5800725" y="3146532"/>
+            <a:ext cx="0" cy="632166"/>
+          </a:xfrm>
+          <a:prstGeom prst="straightConnector1">
+            <a:avLst/>
+          </a:prstGeom>
+          <a:ln>
+            <a:solidFill>
+              <a:srgbClr val="FF0000"/>
+            </a:solidFill>
+            <a:tailEnd type="arrow"/>
+          </a:ln>
+        </p:spPr>
+        <p:style>
+          <a:lnRef idx="3">
+            <a:schemeClr val="accent2"/>
+          </a:lnRef>
+          <a:fillRef idx="0">
+            <a:schemeClr val="accent2"/>
+          </a:fillRef>
+          <a:effectRef idx="2">
+            <a:schemeClr val="accent2"/>
+          </a:effectRef>
+          <a:fontRef idx="minor">
+            <a:schemeClr val="tx1"/>
+          </a:fontRef>
+        </p:style>
+      </p:cxnSp>
+      <p:cxnSp>
+        <p:nvCxnSpPr>
+          <p:cNvPr id="14" name="Straight Arrow Connector 13">
+            <a:extLst>
+              <a:ext uri="{FF2B5EF4-FFF2-40B4-BE49-F238E27FC236}">
+                <a16:creationId xmlns:a16="http://schemas.microsoft.com/office/drawing/2014/main" id="{D0B62FBF-9EEB-40A1-81A7-B57FA9C5AC75}"/>
+              </a:ext>
+            </a:extLst>
+          </p:cNvPr>
+          <p:cNvCxnSpPr>
+            <a:cxnSpLocks/>
+          </p:cNvCxnSpPr>
+          <p:nvPr/>
+        </p:nvCxnSpPr>
+        <p:spPr>
+          <a:xfrm flipV="1">
+            <a:off x="7553325" y="3597898"/>
+            <a:ext cx="0" cy="632166"/>
+          </a:xfrm>
+          <a:prstGeom prst="straightConnector1">
+            <a:avLst/>
+          </a:prstGeom>
+          <a:ln>
+            <a:solidFill>
+              <a:srgbClr val="FF0000"/>
+            </a:solidFill>
+            <a:tailEnd type="arrow"/>
+          </a:ln>
+        </p:spPr>
+        <p:style>
+          <a:lnRef idx="3">
+            <a:schemeClr val="accent2"/>
+          </a:lnRef>
+          <a:fillRef idx="0">
+            <a:schemeClr val="accent2"/>
+          </a:fillRef>
+          <a:effectRef idx="2">
+            <a:schemeClr val="accent2"/>
+          </a:effectRef>
+          <a:fontRef idx="minor">
+            <a:schemeClr val="tx1"/>
+          </a:fontRef>
+        </p:style>
+      </p:cxnSp>
+      <p:sp>
+        <p:nvSpPr>
+          <p:cNvPr id="15" name="TextBox 14">
+            <a:extLst>
+              <a:ext uri="{FF2B5EF4-FFF2-40B4-BE49-F238E27FC236}">
+                <a16:creationId xmlns:a16="http://schemas.microsoft.com/office/drawing/2014/main" id="{79F197C1-3196-4F69-A930-7500D662B126}"/>
+              </a:ext>
+            </a:extLst>
+          </p:cNvPr>
+          <p:cNvSpPr txBox="1"/>
+          <p:nvPr/>
+        </p:nvSpPr>
+        <p:spPr>
+          <a:xfrm>
+            <a:off x="7186077" y="3211274"/>
+            <a:ext cx="734496" cy="369332"/>
+          </a:xfrm>
+          <a:prstGeom prst="rect">
+            <a:avLst/>
+          </a:prstGeom>
+          <a:noFill/>
+        </p:spPr>
+        <p:txBody>
+          <a:bodyPr wrap="none" rtlCol="0">
+            <a:spAutoFit/>
+          </a:bodyPr>
+          <a:lstStyle/>
+          <a:p>
+            <a:r>
+              <a:rPr lang="en-US" b="1" dirty="0">
+                <a:solidFill>
+                  <a:srgbClr val="FF0000"/>
+                </a:solidFill>
+              </a:rPr>
+              <a:t>50 kN</a:t>
+            </a:r>
+          </a:p>
+        </p:txBody>
+      </p:sp>
+      <p:sp>
+        <p:nvSpPr>
+          <p:cNvPr id="16" name="TextBox 15">
+            <a:extLst>
+              <a:ext uri="{FF2B5EF4-FFF2-40B4-BE49-F238E27FC236}">
+                <a16:creationId xmlns:a16="http://schemas.microsoft.com/office/drawing/2014/main" id="{BC3800B2-5A14-4928-9C00-DDA8AB5B5702}"/>
+              </a:ext>
+            </a:extLst>
+          </p:cNvPr>
+          <p:cNvSpPr txBox="1"/>
+          <p:nvPr/>
+        </p:nvSpPr>
+        <p:spPr>
+          <a:xfrm>
+            <a:off x="5433477" y="2771366"/>
+            <a:ext cx="734496" cy="369332"/>
+          </a:xfrm>
+          <a:prstGeom prst="rect">
+            <a:avLst/>
+          </a:prstGeom>
+          <a:noFill/>
+        </p:spPr>
+        <p:txBody>
+          <a:bodyPr wrap="none" rtlCol="0">
+            <a:spAutoFit/>
+          </a:bodyPr>
+          <a:lstStyle/>
+          <a:p>
+            <a:r>
+              <a:rPr lang="en-US" b="1" dirty="0">
+                <a:solidFill>
+                  <a:srgbClr val="FF0000"/>
+                </a:solidFill>
+              </a:rPr>
+              <a:t>50 kN</a:t>
+            </a:r>
+          </a:p>
+        </p:txBody>
+      </p:sp>
+      <p:cxnSp>
+        <p:nvCxnSpPr>
+          <p:cNvPr id="17" name="Straight Connector 16">
+            <a:extLst>
+              <a:ext uri="{FF2B5EF4-FFF2-40B4-BE49-F238E27FC236}">
+                <a16:creationId xmlns:a16="http://schemas.microsoft.com/office/drawing/2014/main" id="{20035917-2FE1-48A0-97EC-5CD6C373E765}"/>
+              </a:ext>
+            </a:extLst>
+          </p:cNvPr>
+          <p:cNvCxnSpPr>
+            <a:cxnSpLocks/>
+          </p:cNvCxnSpPr>
+          <p:nvPr/>
+        </p:nvCxnSpPr>
+        <p:spPr>
+          <a:xfrm flipV="1">
+            <a:off x="5305425" y="2008635"/>
+            <a:ext cx="0" cy="1083299"/>
+          </a:xfrm>
+          <a:prstGeom prst="line">
+            <a:avLst/>
+          </a:prstGeom>
+        </p:spPr>
+        <p:style>
+          <a:lnRef idx="1">
+            <a:schemeClr val="accent1"/>
+          </a:lnRef>
+          <a:fillRef idx="0">
+            <a:schemeClr val="accent1"/>
+          </a:fillRef>
+          <a:effectRef idx="0">
+            <a:schemeClr val="accent1"/>
+          </a:effectRef>
+          <a:fontRef idx="minor">
+            <a:schemeClr val="tx1"/>
+          </a:fontRef>
+        </p:style>
+      </p:cxnSp>
+      <p:cxnSp>
+        <p:nvCxnSpPr>
+          <p:cNvPr id="20" name="Straight Connector 19">
+            <a:extLst>
+              <a:ext uri="{FF2B5EF4-FFF2-40B4-BE49-F238E27FC236}">
+                <a16:creationId xmlns:a16="http://schemas.microsoft.com/office/drawing/2014/main" id="{984EEF61-6E23-452B-8D33-7965B5B46A97}"/>
+              </a:ext>
+            </a:extLst>
+          </p:cNvPr>
+          <p:cNvCxnSpPr>
+            <a:cxnSpLocks/>
+          </p:cNvCxnSpPr>
+          <p:nvPr/>
+        </p:nvCxnSpPr>
+        <p:spPr>
+          <a:xfrm flipV="1">
+            <a:off x="5819775" y="2008635"/>
+            <a:ext cx="0" cy="661499"/>
+          </a:xfrm>
+          <a:prstGeom prst="line">
+            <a:avLst/>
+          </a:prstGeom>
+        </p:spPr>
+        <p:style>
+          <a:lnRef idx="1">
+            <a:schemeClr val="accent1"/>
+          </a:lnRef>
+          <a:fillRef idx="0">
+            <a:schemeClr val="accent1"/>
+          </a:fillRef>
+          <a:effectRef idx="0">
+            <a:schemeClr val="accent1"/>
+          </a:effectRef>
+          <a:fontRef idx="minor">
+            <a:schemeClr val="tx1"/>
+          </a:fontRef>
+        </p:style>
+      </p:cxnSp>
+      <p:cxnSp>
+        <p:nvCxnSpPr>
+          <p:cNvPr id="22" name="Straight Connector 21">
+            <a:extLst>
+              <a:ext uri="{FF2B5EF4-FFF2-40B4-BE49-F238E27FC236}">
+                <a16:creationId xmlns:a16="http://schemas.microsoft.com/office/drawing/2014/main" id="{99CC64DE-F9DB-41E9-A877-9E2C617DA084}"/>
+              </a:ext>
+            </a:extLst>
+          </p:cNvPr>
+          <p:cNvCxnSpPr>
+            <a:cxnSpLocks/>
+          </p:cNvCxnSpPr>
+          <p:nvPr/>
+        </p:nvCxnSpPr>
+        <p:spPr>
+          <a:xfrm flipV="1">
+            <a:off x="6435779" y="2008635"/>
+            <a:ext cx="0" cy="2033100"/>
+          </a:xfrm>
+          <a:prstGeom prst="line">
+            <a:avLst/>
+          </a:prstGeom>
+        </p:spPr>
+        <p:style>
+          <a:lnRef idx="1">
+            <a:schemeClr val="accent1"/>
+          </a:lnRef>
+          <a:fillRef idx="0">
+            <a:schemeClr val="accent1"/>
+          </a:fillRef>
+          <a:effectRef idx="0">
+            <a:schemeClr val="accent1"/>
+          </a:effectRef>
+          <a:fontRef idx="minor">
+            <a:schemeClr val="tx1"/>
+          </a:fontRef>
+        </p:style>
+      </p:cxnSp>
+      <p:cxnSp>
+        <p:nvCxnSpPr>
+          <p:cNvPr id="24" name="Straight Connector 23">
+            <a:extLst>
+              <a:ext uri="{FF2B5EF4-FFF2-40B4-BE49-F238E27FC236}">
+                <a16:creationId xmlns:a16="http://schemas.microsoft.com/office/drawing/2014/main" id="{DEEB0096-A8D1-46AD-A686-510DE0BF7628}"/>
+              </a:ext>
+            </a:extLst>
+          </p:cNvPr>
+          <p:cNvCxnSpPr>
+            <a:cxnSpLocks/>
+          </p:cNvCxnSpPr>
+          <p:nvPr/>
+        </p:nvCxnSpPr>
+        <p:spPr>
+          <a:xfrm flipV="1">
+            <a:off x="7553325" y="2008635"/>
+            <a:ext cx="0" cy="1083299"/>
+          </a:xfrm>
+          <a:prstGeom prst="line">
+            <a:avLst/>
+          </a:prstGeom>
+        </p:spPr>
+        <p:style>
+          <a:lnRef idx="1">
+            <a:schemeClr val="accent1"/>
+          </a:lnRef>
+          <a:fillRef idx="0">
+            <a:schemeClr val="accent1"/>
+          </a:fillRef>
+          <a:effectRef idx="0">
+            <a:schemeClr val="accent1"/>
+          </a:effectRef>
+          <a:fontRef idx="minor">
+            <a:schemeClr val="tx1"/>
+          </a:fontRef>
+        </p:style>
+      </p:cxnSp>
+      <p:cxnSp>
+        <p:nvCxnSpPr>
+          <p:cNvPr id="26" name="Straight Connector 25">
+            <a:extLst>
+              <a:ext uri="{FF2B5EF4-FFF2-40B4-BE49-F238E27FC236}">
+                <a16:creationId xmlns:a16="http://schemas.microsoft.com/office/drawing/2014/main" id="{E47CB59F-27CA-48DC-84EF-6466A701DC42}"/>
+              </a:ext>
+            </a:extLst>
+          </p:cNvPr>
+          <p:cNvCxnSpPr>
+            <a:cxnSpLocks/>
+          </p:cNvCxnSpPr>
+          <p:nvPr/>
+        </p:nvCxnSpPr>
+        <p:spPr>
+          <a:xfrm flipH="1">
+            <a:off x="5305425" y="2286000"/>
+            <a:ext cx="2247900" cy="1"/>
+          </a:xfrm>
+          <a:prstGeom prst="line">
+            <a:avLst/>
+          </a:prstGeom>
+        </p:spPr>
+        <p:style>
+          <a:lnRef idx="1">
+            <a:schemeClr val="accent1"/>
+          </a:lnRef>
+          <a:fillRef idx="0">
+            <a:schemeClr val="accent1"/>
+          </a:fillRef>
+          <a:effectRef idx="0">
+            <a:schemeClr val="accent1"/>
+          </a:effectRef>
+          <a:fontRef idx="minor">
+            <a:schemeClr val="tx1"/>
+          </a:fontRef>
+        </p:style>
+      </p:cxnSp>
+      <p:sp>
+        <p:nvSpPr>
+          <p:cNvPr id="18" name="TextBox 17">
+            <a:extLst>
+              <a:ext uri="{FF2B5EF4-FFF2-40B4-BE49-F238E27FC236}">
+                <a16:creationId xmlns:a16="http://schemas.microsoft.com/office/drawing/2014/main" id="{4E10356C-3E35-4878-B544-1DAFADBB65ED}"/>
+              </a:ext>
+            </a:extLst>
+          </p:cNvPr>
+          <p:cNvSpPr txBox="1"/>
+          <p:nvPr/>
+        </p:nvSpPr>
+        <p:spPr>
+          <a:xfrm>
+            <a:off x="5331136" y="2125608"/>
+            <a:ext cx="473640" cy="338554"/>
+          </a:xfrm>
+          <a:prstGeom prst="rect">
+            <a:avLst/>
+          </a:prstGeom>
+          <a:solidFill>
+            <a:schemeClr val="bg1"/>
+          </a:solidFill>
+        </p:spPr>
+        <p:txBody>
+          <a:bodyPr wrap="square" rtlCol="0">
+            <a:spAutoFit/>
+          </a:bodyPr>
+          <a:lstStyle/>
+          <a:p>
+            <a:pPr algn="ctr"/>
+            <a:r>
+              <a:rPr lang="en-US" sz="1600" dirty="0">
+                <a:solidFill>
+                  <a:schemeClr val="accent1"/>
+                </a:solidFill>
+              </a:rPr>
+              <a:t>8m</a:t>
+            </a:r>
+          </a:p>
+        </p:txBody>
+      </p:sp>
+      <p:sp>
+        <p:nvSpPr>
+          <p:cNvPr id="29" name="TextBox 28">
+            <a:extLst>
+              <a:ext uri="{FF2B5EF4-FFF2-40B4-BE49-F238E27FC236}">
+                <a16:creationId xmlns:a16="http://schemas.microsoft.com/office/drawing/2014/main" id="{6BBD2B99-2FC3-4572-8E4A-D37FC3488284}"/>
+              </a:ext>
+            </a:extLst>
+          </p:cNvPr>
+          <p:cNvSpPr txBox="1"/>
+          <p:nvPr/>
+        </p:nvSpPr>
+        <p:spPr>
+          <a:xfrm>
+            <a:off x="5857875" y="2124075"/>
+            <a:ext cx="561949" cy="338554"/>
+          </a:xfrm>
+          <a:prstGeom prst="rect">
+            <a:avLst/>
+          </a:prstGeom>
+          <a:solidFill>
+            <a:schemeClr val="bg1"/>
+          </a:solidFill>
+        </p:spPr>
+        <p:txBody>
+          <a:bodyPr wrap="square" rtlCol="0">
+            <a:spAutoFit/>
+          </a:bodyPr>
+          <a:lstStyle/>
+          <a:p>
+            <a:pPr algn="ctr"/>
+            <a:r>
+              <a:rPr lang="en-US" sz="1600" dirty="0">
+                <a:solidFill>
+                  <a:schemeClr val="accent1"/>
+                </a:solidFill>
+              </a:rPr>
+              <a:t>12m</a:t>
+            </a:r>
+          </a:p>
+        </p:txBody>
+      </p:sp>
+      <p:sp>
+        <p:nvSpPr>
+          <p:cNvPr id="30" name="TextBox 29">
+            <a:extLst>
+              <a:ext uri="{FF2B5EF4-FFF2-40B4-BE49-F238E27FC236}">
+                <a16:creationId xmlns:a16="http://schemas.microsoft.com/office/drawing/2014/main" id="{7C69CB65-EE8A-47E6-A4DA-70F349DC6D94}"/>
+              </a:ext>
+            </a:extLst>
+          </p:cNvPr>
+          <p:cNvSpPr txBox="1"/>
+          <p:nvPr/>
+        </p:nvSpPr>
+        <p:spPr>
+          <a:xfrm>
+            <a:off x="6716668" y="2124075"/>
+            <a:ext cx="561949" cy="338554"/>
+          </a:xfrm>
+          <a:prstGeom prst="rect">
+            <a:avLst/>
+          </a:prstGeom>
+          <a:solidFill>
+            <a:schemeClr val="bg1"/>
+          </a:solidFill>
+        </p:spPr>
+        <p:txBody>
+          <a:bodyPr wrap="square" rtlCol="0">
+            <a:spAutoFit/>
+          </a:bodyPr>
+          <a:lstStyle/>
+          <a:p>
+            <a:pPr algn="ctr"/>
+            <a:r>
+              <a:rPr lang="en-US" sz="1600" dirty="0">
+                <a:solidFill>
+                  <a:schemeClr val="accent1"/>
+                </a:solidFill>
+              </a:rPr>
+              <a:t>20m</a:t>
+            </a:r>
+          </a:p>
+        </p:txBody>
+      </p:sp>
+      <p:cxnSp>
+        <p:nvCxnSpPr>
+          <p:cNvPr id="32" name="Straight Connector 31">
+            <a:extLst>
+              <a:ext uri="{FF2B5EF4-FFF2-40B4-BE49-F238E27FC236}">
+                <a16:creationId xmlns:a16="http://schemas.microsoft.com/office/drawing/2014/main" id="{B82DE590-6E4B-44ED-8D7F-E323D6FF828C}"/>
+              </a:ext>
+            </a:extLst>
+          </p:cNvPr>
+          <p:cNvCxnSpPr>
+            <a:cxnSpLocks/>
+          </p:cNvCxnSpPr>
+          <p:nvPr/>
+        </p:nvCxnSpPr>
+        <p:spPr>
+          <a:xfrm flipH="1" flipV="1">
+            <a:off x="5715000" y="4216638"/>
+            <a:ext cx="558746" cy="0"/>
+          </a:xfrm>
+          <a:prstGeom prst="line">
+            <a:avLst/>
+          </a:prstGeom>
+        </p:spPr>
+        <p:style>
+          <a:lnRef idx="1">
+            <a:schemeClr val="accent1"/>
+          </a:lnRef>
+          <a:fillRef idx="0">
+            <a:schemeClr val="accent1"/>
+          </a:fillRef>
+          <a:effectRef idx="0">
+            <a:schemeClr val="accent1"/>
+          </a:effectRef>
+          <a:fontRef idx="minor">
+            <a:schemeClr val="tx1"/>
+          </a:fontRef>
+        </p:style>
+      </p:cxnSp>
+      <p:cxnSp>
+        <p:nvCxnSpPr>
+          <p:cNvPr id="34" name="Straight Arrow Connector 33">
+            <a:extLst>
+              <a:ext uri="{FF2B5EF4-FFF2-40B4-BE49-F238E27FC236}">
+                <a16:creationId xmlns:a16="http://schemas.microsoft.com/office/drawing/2014/main" id="{592FF436-CFB3-46A7-8540-4ABDBFD5FF4D}"/>
+              </a:ext>
+            </a:extLst>
+          </p:cNvPr>
+          <p:cNvCxnSpPr>
+            <a:cxnSpLocks/>
+          </p:cNvCxnSpPr>
+          <p:nvPr/>
+        </p:nvCxnSpPr>
+        <p:spPr>
+          <a:xfrm>
+            <a:off x="6465986" y="5845774"/>
+            <a:ext cx="304800" cy="0"/>
+          </a:xfrm>
+          <a:prstGeom prst="straightConnector1">
+            <a:avLst/>
+          </a:prstGeom>
+          <a:ln>
+            <a:solidFill>
+              <a:srgbClr val="FF0000"/>
+            </a:solidFill>
+            <a:tailEnd type="arrow"/>
+          </a:ln>
+        </p:spPr>
+        <p:style>
+          <a:lnRef idx="3">
+            <a:schemeClr val="accent2"/>
+          </a:lnRef>
+          <a:fillRef idx="0">
+            <a:schemeClr val="accent2"/>
+          </a:fillRef>
+          <a:effectRef idx="2">
+            <a:schemeClr val="accent2"/>
+          </a:effectRef>
+          <a:fontRef idx="minor">
+            <a:schemeClr val="tx1"/>
+          </a:fontRef>
+        </p:style>
+      </p:cxnSp>
+      <p:sp>
+        <p:nvSpPr>
+          <p:cNvPr id="35" name="TextBox 34">
+            <a:extLst>
+              <a:ext uri="{FF2B5EF4-FFF2-40B4-BE49-F238E27FC236}">
+                <a16:creationId xmlns:a16="http://schemas.microsoft.com/office/drawing/2014/main" id="{EA07CFE6-194B-4793-AFE2-0416483D8B36}"/>
+              </a:ext>
+            </a:extLst>
+          </p:cNvPr>
+          <p:cNvSpPr txBox="1"/>
+          <p:nvPr/>
+        </p:nvSpPr>
+        <p:spPr>
+          <a:xfrm>
+            <a:off x="7002523" y="5650468"/>
+            <a:ext cx="617477" cy="369332"/>
+          </a:xfrm>
+          <a:prstGeom prst="rect">
+            <a:avLst/>
+          </a:prstGeom>
+          <a:noFill/>
+        </p:spPr>
+        <p:txBody>
+          <a:bodyPr wrap="none" rtlCol="0">
+            <a:spAutoFit/>
+          </a:bodyPr>
+          <a:lstStyle/>
+          <a:p>
+            <a:r>
+              <a:rPr lang="en-US" b="1" dirty="0">
+                <a:solidFill>
+                  <a:srgbClr val="FF0000"/>
+                </a:solidFill>
+              </a:rPr>
+              <a:t>8 kN</a:t>
+            </a:r>
+          </a:p>
+        </p:txBody>
+      </p:sp>
+      <p:cxnSp>
+        <p:nvCxnSpPr>
+          <p:cNvPr id="39" name="Straight Connector 38">
+            <a:extLst>
+              <a:ext uri="{FF2B5EF4-FFF2-40B4-BE49-F238E27FC236}">
+                <a16:creationId xmlns:a16="http://schemas.microsoft.com/office/drawing/2014/main" id="{D2BB89C5-4062-4A06-A8A2-54D1ED53EE99}"/>
+              </a:ext>
+            </a:extLst>
+          </p:cNvPr>
+          <p:cNvCxnSpPr>
+            <a:cxnSpLocks/>
+          </p:cNvCxnSpPr>
+          <p:nvPr/>
+        </p:nvCxnSpPr>
+        <p:spPr>
+          <a:xfrm flipH="1" flipV="1">
+            <a:off x="5715000" y="5829300"/>
+            <a:ext cx="558746" cy="0"/>
+          </a:xfrm>
+          <a:prstGeom prst="line">
+            <a:avLst/>
+          </a:prstGeom>
+        </p:spPr>
+        <p:style>
+          <a:lnRef idx="1">
+            <a:schemeClr val="accent1"/>
+          </a:lnRef>
+          <a:fillRef idx="0">
+            <a:schemeClr val="accent1"/>
+          </a:fillRef>
+          <a:effectRef idx="0">
+            <a:schemeClr val="accent1"/>
+          </a:effectRef>
+          <a:fontRef idx="minor">
+            <a:schemeClr val="tx1"/>
+          </a:fontRef>
+        </p:style>
+      </p:cxnSp>
+      <p:cxnSp>
+        <p:nvCxnSpPr>
+          <p:cNvPr id="40" name="Straight Connector 39">
+            <a:extLst>
+              <a:ext uri="{FF2B5EF4-FFF2-40B4-BE49-F238E27FC236}">
+                <a16:creationId xmlns:a16="http://schemas.microsoft.com/office/drawing/2014/main" id="{352F8B7D-7BFF-4A18-B321-D9D804C0612E}"/>
+              </a:ext>
+            </a:extLst>
+          </p:cNvPr>
+          <p:cNvCxnSpPr>
+            <a:cxnSpLocks/>
+          </p:cNvCxnSpPr>
+          <p:nvPr/>
+        </p:nvCxnSpPr>
+        <p:spPr>
+          <a:xfrm flipH="1" flipV="1">
+            <a:off x="5994373" y="4212772"/>
+            <a:ext cx="1" cy="1633002"/>
+          </a:xfrm>
+          <a:prstGeom prst="line">
+            <a:avLst/>
+          </a:prstGeom>
+        </p:spPr>
+        <p:style>
+          <a:lnRef idx="1">
+            <a:schemeClr val="accent1"/>
+          </a:lnRef>
+          <a:fillRef idx="0">
+            <a:schemeClr val="accent1"/>
+          </a:fillRef>
+          <a:effectRef idx="0">
+            <a:schemeClr val="accent1"/>
+          </a:effectRef>
+          <a:fontRef idx="minor">
+            <a:schemeClr val="tx1"/>
+          </a:fontRef>
+        </p:style>
+      </p:cxnSp>
+      <p:sp>
+        <p:nvSpPr>
+          <p:cNvPr id="43" name="TextBox 42">
+            <a:extLst>
+              <a:ext uri="{FF2B5EF4-FFF2-40B4-BE49-F238E27FC236}">
+                <a16:creationId xmlns:a16="http://schemas.microsoft.com/office/drawing/2014/main" id="{815158C2-45DD-4CEE-AE4E-7F784AAF5EC2}"/>
+              </a:ext>
+            </a:extLst>
+          </p:cNvPr>
+          <p:cNvSpPr txBox="1"/>
+          <p:nvPr/>
+        </p:nvSpPr>
+        <p:spPr>
+          <a:xfrm>
+            <a:off x="5715000" y="4859996"/>
+            <a:ext cx="561949" cy="338554"/>
+          </a:xfrm>
+          <a:prstGeom prst="rect">
+            <a:avLst/>
+          </a:prstGeom>
+          <a:solidFill>
+            <a:schemeClr val="bg1"/>
+          </a:solidFill>
+        </p:spPr>
+        <p:txBody>
+          <a:bodyPr wrap="square" rtlCol="0">
+            <a:spAutoFit/>
+          </a:bodyPr>
+          <a:lstStyle/>
+          <a:p>
+            <a:pPr algn="ctr"/>
+            <a:r>
+              <a:rPr lang="en-US" sz="1600" dirty="0">
+                <a:solidFill>
+                  <a:schemeClr val="accent1"/>
+                </a:solidFill>
+              </a:rPr>
+              <a:t>35m</a:t>
+            </a:r>
+          </a:p>
+        </p:txBody>
+      </p:sp>
+    </p:spTree>
+    <p:extLst>
+      <p:ext uri="{BB962C8B-B14F-4D97-AF65-F5344CB8AC3E}">
+        <p14:creationId xmlns:p14="http://schemas.microsoft.com/office/powerpoint/2010/main" val="4006804836"/>
+      </p:ext>
+    </p:extLst>
+  </p:cSld>
+  <p:clrMapOvr>
+    <a:masterClrMapping/>
+  </p:clrMapOvr>
+</p:sld>
+</file>
+
+<file path=ppt/slides/slide13.xml><?xml version="1.0" encoding="utf-8"?>
+<p:sld xmlns:a="http://schemas.openxmlformats.org/drawingml/2006/main" xmlns:r="http://schemas.openxmlformats.org/officeDocument/2006/relationships" xmlns:p="http://schemas.openxmlformats.org/presentationml/2006/main">
+  <p:cSld>
+    <p:spTree>
+      <p:nvGrpSpPr>
+        <p:cNvPr id="1" name=""/>
+        <p:cNvGrpSpPr/>
+        <p:nvPr/>
+      </p:nvGrpSpPr>
+      <p:grpSpPr>
+        <a:xfrm>
+          <a:off x="0" y="0"/>
+          <a:ext cx="0" cy="0"/>
+          <a:chOff x="0" y="0"/>
+          <a:chExt cx="0" cy="0"/>
+        </a:xfrm>
+      </p:grpSpPr>
+      <p:sp>
+        <p:nvSpPr>
+          <p:cNvPr id="2" name="Title 1">
+            <a:extLst>
+              <a:ext uri="{FF2B5EF4-FFF2-40B4-BE49-F238E27FC236}">
+                <a16:creationId xmlns:a16="http://schemas.microsoft.com/office/drawing/2014/main" id="{AF0DF203-D667-4B8A-8A2D-DC54926E82B5}"/>
+              </a:ext>
+            </a:extLst>
+          </p:cNvPr>
+          <p:cNvSpPr>
+            <a:spLocks noGrp="1"/>
+          </p:cNvSpPr>
+          <p:nvPr>
+            <p:ph type="title"/>
+          </p:nvPr>
+        </p:nvSpPr>
+        <p:spPr/>
+        <p:txBody>
+          <a:bodyPr>
+            <a:normAutofit fontScale="90000"/>
+          </a:bodyPr>
+          <a:lstStyle/>
+          <a:p>
+            <a:r>
+              <a:rPr lang="en-US" dirty="0"/>
+              <a:t>Equivalent Force Couple System Worked Example</a:t>
+            </a:r>
+          </a:p>
+        </p:txBody>
+      </p:sp>
+      <p:sp>
+        <p:nvSpPr>
+          <p:cNvPr id="4" name="Slide Number Placeholder 3">
+            <a:extLst>
+              <a:ext uri="{FF2B5EF4-FFF2-40B4-BE49-F238E27FC236}">
+                <a16:creationId xmlns:a16="http://schemas.microsoft.com/office/drawing/2014/main" id="{B8EC392D-9059-40C6-8F8F-B409380126A0}"/>
+              </a:ext>
+            </a:extLst>
+          </p:cNvPr>
+          <p:cNvSpPr>
+            <a:spLocks noGrp="1"/>
+          </p:cNvSpPr>
+          <p:nvPr>
+            <p:ph type="sldNum" sz="quarter" idx="12"/>
+          </p:nvPr>
+        </p:nvSpPr>
+        <p:spPr/>
+        <p:txBody>
+          <a:bodyPr/>
+          <a:lstStyle/>
+          <a:p>
+            <a:fld id="{929262FE-7F58-4A1E-8AF3-5A510A86DEBD}" type="slidenum">
+              <a:rPr lang="en-US" smtClean="0"/>
+              <a:t>13</a:t>
+            </a:fld>
+            <a:endParaRPr lang="en-US"/>
+          </a:p>
+        </p:txBody>
+      </p:sp>
+      <p:pic>
+        <p:nvPicPr>
+          <p:cNvPr id="1026" name="Picture 2" descr="Jet, Plane, Airline, Airliner, Airplane, Aeroplane">
+            <a:extLst>
+              <a:ext uri="{FF2B5EF4-FFF2-40B4-BE49-F238E27FC236}">
+                <a16:creationId xmlns:a16="http://schemas.microsoft.com/office/drawing/2014/main" id="{4F8CE84E-08CE-40D0-ADC2-A16A68B3C85D}"/>
+              </a:ext>
+            </a:extLst>
+          </p:cNvPr>
+          <p:cNvPicPr>
+            <a:picLocks noChangeAspect="1" noChangeArrowheads="1"/>
+          </p:cNvPicPr>
+          <p:nvPr/>
+        </p:nvPicPr>
+        <p:blipFill>
+          <a:blip r:embed="rId2">
+            <a:extLst>
+              <a:ext uri="{28A0092B-C50C-407E-A947-70E740481C1C}">
+                <a14:useLocalDpi xmlns:a14="http://schemas.microsoft.com/office/drawing/2010/main" val="0"/>
+              </a:ext>
+            </a:extLst>
+          </a:blip>
+          <a:srcRect/>
+          <a:stretch>
+            <a:fillRect/>
+          </a:stretch>
+        </p:blipFill>
+        <p:spPr bwMode="auto">
+          <a:xfrm>
+            <a:off x="3048423" y="2590800"/>
+            <a:ext cx="3123777" cy="3581400"/>
+          </a:xfrm>
+          <a:prstGeom prst="rect">
+            <a:avLst/>
+          </a:prstGeom>
+          <a:noFill/>
+          <a:extLst>
+            <a:ext uri="{909E8E84-426E-40DD-AFC4-6F175D3DCCD1}">
+              <a14:hiddenFill xmlns:a14="http://schemas.microsoft.com/office/drawing/2010/main">
+                <a:solidFill>
+                  <a:srgbClr val="FFFFFF"/>
+                </a:solidFill>
+              </a14:hiddenFill>
+            </a:ext>
+          </a:extLst>
+        </p:spPr>
+      </p:pic>
+      <p:sp>
+        <p:nvSpPr>
+          <p:cNvPr id="6" name="Oval 5">
+            <a:extLst>
+              <a:ext uri="{FF2B5EF4-FFF2-40B4-BE49-F238E27FC236}">
+                <a16:creationId xmlns:a16="http://schemas.microsoft.com/office/drawing/2014/main" id="{3FBBA8E5-E33A-404E-88F0-B2E9B2EDA30F}"/>
+              </a:ext>
+            </a:extLst>
+          </p:cNvPr>
+          <p:cNvSpPr/>
+          <p:nvPr/>
+        </p:nvSpPr>
+        <p:spPr>
+          <a:xfrm>
+            <a:off x="4569302" y="4188063"/>
+            <a:ext cx="91440" cy="87868"/>
+          </a:xfrm>
+          <a:prstGeom prst="ellipse">
+            <a:avLst/>
+          </a:prstGeom>
+          <a:solidFill>
+            <a:schemeClr val="bg1"/>
+          </a:solidFill>
+        </p:spPr>
+        <p:style>
+          <a:lnRef idx="2">
+            <a:schemeClr val="dk1">
+              <a:shade val="50000"/>
+            </a:schemeClr>
+          </a:lnRef>
+          <a:fillRef idx="1">
+            <a:schemeClr val="dk1"/>
+          </a:fillRef>
+          <a:effectRef idx="0">
+            <a:schemeClr val="dk1"/>
+          </a:effectRef>
+          <a:fontRef idx="minor">
+            <a:schemeClr val="lt1"/>
+          </a:fontRef>
+        </p:style>
+        <p:txBody>
+          <a:bodyPr rtlCol="0" anchor="ctr"/>
+          <a:lstStyle/>
+          <a:p>
+            <a:pPr algn="ctr"/>
+            <a:endParaRPr lang="en-US"/>
+          </a:p>
+        </p:txBody>
+      </p:sp>
+      <p:sp>
+        <p:nvSpPr>
+          <p:cNvPr id="7" name="TextBox 6">
+            <a:extLst>
+              <a:ext uri="{FF2B5EF4-FFF2-40B4-BE49-F238E27FC236}">
+                <a16:creationId xmlns:a16="http://schemas.microsoft.com/office/drawing/2014/main" id="{5C896006-B35D-4171-B503-225FE4C37756}"/>
+              </a:ext>
+            </a:extLst>
+          </p:cNvPr>
+          <p:cNvSpPr txBox="1"/>
+          <p:nvPr/>
+        </p:nvSpPr>
+        <p:spPr>
+          <a:xfrm>
+            <a:off x="4267623" y="3896689"/>
+            <a:ext cx="332142" cy="369332"/>
+          </a:xfrm>
+          <a:prstGeom prst="rect">
+            <a:avLst/>
+          </a:prstGeom>
+          <a:noFill/>
+        </p:spPr>
+        <p:txBody>
+          <a:bodyPr wrap="none" rtlCol="0">
+            <a:spAutoFit/>
+          </a:bodyPr>
+          <a:lstStyle/>
+          <a:p>
+            <a:r>
+              <a:rPr lang="en-US" b="1" dirty="0">
+                <a:solidFill>
+                  <a:schemeClr val="bg1"/>
+                </a:solidFill>
+              </a:rPr>
+              <a:t>G</a:t>
+            </a:r>
+          </a:p>
+        </p:txBody>
+      </p:sp>
+      <p:cxnSp>
+        <p:nvCxnSpPr>
+          <p:cNvPr id="10" name="Straight Arrow Connector 9">
+            <a:extLst>
+              <a:ext uri="{FF2B5EF4-FFF2-40B4-BE49-F238E27FC236}">
+                <a16:creationId xmlns:a16="http://schemas.microsoft.com/office/drawing/2014/main" id="{76E6C61A-B3BD-424B-8773-E0BA2E09DCF2}"/>
+              </a:ext>
+            </a:extLst>
+          </p:cNvPr>
+          <p:cNvCxnSpPr>
+            <a:cxnSpLocks/>
+          </p:cNvCxnSpPr>
+          <p:nvPr/>
+        </p:nvCxnSpPr>
+        <p:spPr>
+          <a:xfrm flipV="1">
+            <a:off x="3477048" y="3580606"/>
+            <a:ext cx="0" cy="632166"/>
+          </a:xfrm>
+          <a:prstGeom prst="straightConnector1">
+            <a:avLst/>
+          </a:prstGeom>
+          <a:ln>
+            <a:solidFill>
+              <a:srgbClr val="FF0000"/>
+            </a:solidFill>
+            <a:tailEnd type="arrow"/>
+          </a:ln>
+        </p:spPr>
+        <p:style>
+          <a:lnRef idx="3">
+            <a:schemeClr val="accent2"/>
+          </a:lnRef>
+          <a:fillRef idx="0">
+            <a:schemeClr val="accent2"/>
+          </a:fillRef>
+          <a:effectRef idx="2">
+            <a:schemeClr val="accent2"/>
+          </a:effectRef>
+          <a:fontRef idx="minor">
+            <a:schemeClr val="tx1"/>
+          </a:fontRef>
+        </p:style>
+      </p:cxnSp>
+      <p:sp>
+        <p:nvSpPr>
+          <p:cNvPr id="11" name="TextBox 10">
+            <a:extLst>
+              <a:ext uri="{FF2B5EF4-FFF2-40B4-BE49-F238E27FC236}">
+                <a16:creationId xmlns:a16="http://schemas.microsoft.com/office/drawing/2014/main" id="{C167EDF4-5AFB-4E1D-ADA6-C0E239E857BA}"/>
+              </a:ext>
+            </a:extLst>
+          </p:cNvPr>
+          <p:cNvSpPr txBox="1"/>
+          <p:nvPr/>
+        </p:nvSpPr>
+        <p:spPr>
+          <a:xfrm>
+            <a:off x="3143138" y="3211274"/>
+            <a:ext cx="734496" cy="369332"/>
+          </a:xfrm>
+          <a:prstGeom prst="rect">
+            <a:avLst/>
+          </a:prstGeom>
+          <a:noFill/>
+        </p:spPr>
+        <p:txBody>
+          <a:bodyPr wrap="none" rtlCol="0">
+            <a:spAutoFit/>
+          </a:bodyPr>
+          <a:lstStyle/>
+          <a:p>
+            <a:r>
+              <a:rPr lang="en-US" b="1" dirty="0">
+                <a:solidFill>
+                  <a:srgbClr val="FF0000"/>
+                </a:solidFill>
+              </a:rPr>
+              <a:t>50 kN</a:t>
+            </a:r>
+          </a:p>
+        </p:txBody>
+      </p:sp>
+      <p:cxnSp>
+        <p:nvCxnSpPr>
+          <p:cNvPr id="13" name="Straight Arrow Connector 12">
+            <a:extLst>
+              <a:ext uri="{FF2B5EF4-FFF2-40B4-BE49-F238E27FC236}">
+                <a16:creationId xmlns:a16="http://schemas.microsoft.com/office/drawing/2014/main" id="{4FDE7519-CD29-4EDC-927A-D54840D5AC93}"/>
+              </a:ext>
+            </a:extLst>
+          </p:cNvPr>
+          <p:cNvCxnSpPr>
+            <a:cxnSpLocks/>
+          </p:cNvCxnSpPr>
+          <p:nvPr/>
+        </p:nvCxnSpPr>
+        <p:spPr>
+          <a:xfrm flipV="1">
+            <a:off x="3972348" y="3146532"/>
+            <a:ext cx="0" cy="632166"/>
+          </a:xfrm>
+          <a:prstGeom prst="straightConnector1">
+            <a:avLst/>
+          </a:prstGeom>
+          <a:ln>
+            <a:solidFill>
+              <a:srgbClr val="FF0000"/>
+            </a:solidFill>
+            <a:tailEnd type="arrow"/>
+          </a:ln>
+        </p:spPr>
+        <p:style>
+          <a:lnRef idx="3">
+            <a:schemeClr val="accent2"/>
+          </a:lnRef>
+          <a:fillRef idx="0">
+            <a:schemeClr val="accent2"/>
+          </a:fillRef>
+          <a:effectRef idx="2">
+            <a:schemeClr val="accent2"/>
+          </a:effectRef>
+          <a:fontRef idx="minor">
+            <a:schemeClr val="tx1"/>
+          </a:fontRef>
+        </p:style>
+      </p:cxnSp>
+      <p:cxnSp>
+        <p:nvCxnSpPr>
+          <p:cNvPr id="14" name="Straight Arrow Connector 13">
+            <a:extLst>
+              <a:ext uri="{FF2B5EF4-FFF2-40B4-BE49-F238E27FC236}">
+                <a16:creationId xmlns:a16="http://schemas.microsoft.com/office/drawing/2014/main" id="{D0B62FBF-9EEB-40A1-81A7-B57FA9C5AC75}"/>
+              </a:ext>
+            </a:extLst>
+          </p:cNvPr>
+          <p:cNvCxnSpPr>
+            <a:cxnSpLocks/>
+          </p:cNvCxnSpPr>
+          <p:nvPr/>
+        </p:nvCxnSpPr>
+        <p:spPr>
+          <a:xfrm flipV="1">
+            <a:off x="5724948" y="3597898"/>
+            <a:ext cx="0" cy="632166"/>
+          </a:xfrm>
+          <a:prstGeom prst="straightConnector1">
+            <a:avLst/>
+          </a:prstGeom>
+          <a:ln>
+            <a:solidFill>
+              <a:srgbClr val="FF0000"/>
+            </a:solidFill>
+            <a:tailEnd type="arrow"/>
+          </a:ln>
+        </p:spPr>
+        <p:style>
+          <a:lnRef idx="3">
+            <a:schemeClr val="accent2"/>
+          </a:lnRef>
+          <a:fillRef idx="0">
+            <a:schemeClr val="accent2"/>
+          </a:fillRef>
+          <a:effectRef idx="2">
+            <a:schemeClr val="accent2"/>
+          </a:effectRef>
+          <a:fontRef idx="minor">
+            <a:schemeClr val="tx1"/>
+          </a:fontRef>
+        </p:style>
+      </p:cxnSp>
+      <p:sp>
+        <p:nvSpPr>
+          <p:cNvPr id="15" name="TextBox 14">
+            <a:extLst>
+              <a:ext uri="{FF2B5EF4-FFF2-40B4-BE49-F238E27FC236}">
+                <a16:creationId xmlns:a16="http://schemas.microsoft.com/office/drawing/2014/main" id="{79F197C1-3196-4F69-A930-7500D662B126}"/>
+              </a:ext>
+            </a:extLst>
+          </p:cNvPr>
+          <p:cNvSpPr txBox="1"/>
+          <p:nvPr/>
+        </p:nvSpPr>
+        <p:spPr>
+          <a:xfrm>
+            <a:off x="5357700" y="3211274"/>
+            <a:ext cx="734496" cy="369332"/>
+          </a:xfrm>
+          <a:prstGeom prst="rect">
+            <a:avLst/>
+          </a:prstGeom>
+          <a:noFill/>
+        </p:spPr>
+        <p:txBody>
+          <a:bodyPr wrap="none" rtlCol="0">
+            <a:spAutoFit/>
+          </a:bodyPr>
+          <a:lstStyle/>
+          <a:p>
+            <a:r>
+              <a:rPr lang="en-US" b="1" dirty="0">
+                <a:solidFill>
+                  <a:srgbClr val="FF0000"/>
+                </a:solidFill>
+              </a:rPr>
+              <a:t>50 kN</a:t>
+            </a:r>
+          </a:p>
+        </p:txBody>
+      </p:sp>
+      <p:sp>
+        <p:nvSpPr>
+          <p:cNvPr id="16" name="TextBox 15">
+            <a:extLst>
+              <a:ext uri="{FF2B5EF4-FFF2-40B4-BE49-F238E27FC236}">
+                <a16:creationId xmlns:a16="http://schemas.microsoft.com/office/drawing/2014/main" id="{BC3800B2-5A14-4928-9C00-DDA8AB5B5702}"/>
+              </a:ext>
+            </a:extLst>
+          </p:cNvPr>
+          <p:cNvSpPr txBox="1"/>
+          <p:nvPr/>
+        </p:nvSpPr>
+        <p:spPr>
+          <a:xfrm>
+            <a:off x="3605100" y="2771366"/>
+            <a:ext cx="734496" cy="369332"/>
+          </a:xfrm>
+          <a:prstGeom prst="rect">
+            <a:avLst/>
+          </a:prstGeom>
+          <a:noFill/>
+        </p:spPr>
+        <p:txBody>
+          <a:bodyPr wrap="none" rtlCol="0">
+            <a:spAutoFit/>
+          </a:bodyPr>
+          <a:lstStyle/>
+          <a:p>
+            <a:r>
+              <a:rPr lang="en-US" b="1" dirty="0">
+                <a:solidFill>
+                  <a:srgbClr val="FF0000"/>
+                </a:solidFill>
+              </a:rPr>
+              <a:t>50 kN</a:t>
+            </a:r>
+          </a:p>
+        </p:txBody>
+      </p:sp>
+      <p:cxnSp>
+        <p:nvCxnSpPr>
+          <p:cNvPr id="17" name="Straight Connector 16">
+            <a:extLst>
+              <a:ext uri="{FF2B5EF4-FFF2-40B4-BE49-F238E27FC236}">
+                <a16:creationId xmlns:a16="http://schemas.microsoft.com/office/drawing/2014/main" id="{20035917-2FE1-48A0-97EC-5CD6C373E765}"/>
+              </a:ext>
+            </a:extLst>
+          </p:cNvPr>
+          <p:cNvCxnSpPr>
+            <a:cxnSpLocks/>
+          </p:cNvCxnSpPr>
+          <p:nvPr/>
+        </p:nvCxnSpPr>
+        <p:spPr>
+          <a:xfrm flipV="1">
+            <a:off x="3477048" y="2008635"/>
+            <a:ext cx="0" cy="1083299"/>
+          </a:xfrm>
+          <a:prstGeom prst="line">
+            <a:avLst/>
+          </a:prstGeom>
+        </p:spPr>
+        <p:style>
+          <a:lnRef idx="1">
+            <a:schemeClr val="accent1"/>
+          </a:lnRef>
+          <a:fillRef idx="0">
+            <a:schemeClr val="accent1"/>
+          </a:fillRef>
+          <a:effectRef idx="0">
+            <a:schemeClr val="accent1"/>
+          </a:effectRef>
+          <a:fontRef idx="minor">
+            <a:schemeClr val="tx1"/>
+          </a:fontRef>
+        </p:style>
+      </p:cxnSp>
+      <p:cxnSp>
+        <p:nvCxnSpPr>
+          <p:cNvPr id="20" name="Straight Connector 19">
+            <a:extLst>
+              <a:ext uri="{FF2B5EF4-FFF2-40B4-BE49-F238E27FC236}">
+                <a16:creationId xmlns:a16="http://schemas.microsoft.com/office/drawing/2014/main" id="{984EEF61-6E23-452B-8D33-7965B5B46A97}"/>
+              </a:ext>
+            </a:extLst>
+          </p:cNvPr>
+          <p:cNvCxnSpPr>
+            <a:cxnSpLocks/>
+          </p:cNvCxnSpPr>
+          <p:nvPr/>
+        </p:nvCxnSpPr>
+        <p:spPr>
+          <a:xfrm flipV="1">
+            <a:off x="3991398" y="2008635"/>
+            <a:ext cx="0" cy="661499"/>
+          </a:xfrm>
+          <a:prstGeom prst="line">
+            <a:avLst/>
+          </a:prstGeom>
+        </p:spPr>
+        <p:style>
+          <a:lnRef idx="1">
+            <a:schemeClr val="accent1"/>
+          </a:lnRef>
+          <a:fillRef idx="0">
+            <a:schemeClr val="accent1"/>
+          </a:fillRef>
+          <a:effectRef idx="0">
+            <a:schemeClr val="accent1"/>
+          </a:effectRef>
+          <a:fontRef idx="minor">
+            <a:schemeClr val="tx1"/>
+          </a:fontRef>
+        </p:style>
+      </p:cxnSp>
+      <p:cxnSp>
+        <p:nvCxnSpPr>
+          <p:cNvPr id="22" name="Straight Connector 21">
+            <a:extLst>
+              <a:ext uri="{FF2B5EF4-FFF2-40B4-BE49-F238E27FC236}">
+                <a16:creationId xmlns:a16="http://schemas.microsoft.com/office/drawing/2014/main" id="{99CC64DE-F9DB-41E9-A877-9E2C617DA084}"/>
+              </a:ext>
+            </a:extLst>
+          </p:cNvPr>
+          <p:cNvCxnSpPr>
+            <a:cxnSpLocks/>
+          </p:cNvCxnSpPr>
+          <p:nvPr/>
+        </p:nvCxnSpPr>
+        <p:spPr>
+          <a:xfrm flipV="1">
+            <a:off x="4607402" y="2008635"/>
+            <a:ext cx="0" cy="2033100"/>
+          </a:xfrm>
+          <a:prstGeom prst="line">
+            <a:avLst/>
+          </a:prstGeom>
+        </p:spPr>
+        <p:style>
+          <a:lnRef idx="1">
+            <a:schemeClr val="accent1"/>
+          </a:lnRef>
+          <a:fillRef idx="0">
+            <a:schemeClr val="accent1"/>
+          </a:fillRef>
+          <a:effectRef idx="0">
+            <a:schemeClr val="accent1"/>
+          </a:effectRef>
+          <a:fontRef idx="minor">
+            <a:schemeClr val="tx1"/>
+          </a:fontRef>
+        </p:style>
+      </p:cxnSp>
+      <p:cxnSp>
+        <p:nvCxnSpPr>
+          <p:cNvPr id="24" name="Straight Connector 23">
+            <a:extLst>
+              <a:ext uri="{FF2B5EF4-FFF2-40B4-BE49-F238E27FC236}">
+                <a16:creationId xmlns:a16="http://schemas.microsoft.com/office/drawing/2014/main" id="{DEEB0096-A8D1-46AD-A686-510DE0BF7628}"/>
+              </a:ext>
+            </a:extLst>
+          </p:cNvPr>
+          <p:cNvCxnSpPr>
+            <a:cxnSpLocks/>
+          </p:cNvCxnSpPr>
+          <p:nvPr/>
+        </p:nvCxnSpPr>
+        <p:spPr>
+          <a:xfrm flipV="1">
+            <a:off x="5724948" y="2008635"/>
+            <a:ext cx="0" cy="1083299"/>
+          </a:xfrm>
+          <a:prstGeom prst="line">
+            <a:avLst/>
+          </a:prstGeom>
+        </p:spPr>
+        <p:style>
+          <a:lnRef idx="1">
+            <a:schemeClr val="accent1"/>
+          </a:lnRef>
+          <a:fillRef idx="0">
+            <a:schemeClr val="accent1"/>
+          </a:fillRef>
+          <a:effectRef idx="0">
+            <a:schemeClr val="accent1"/>
+          </a:effectRef>
+          <a:fontRef idx="minor">
+            <a:schemeClr val="tx1"/>
+          </a:fontRef>
+        </p:style>
+      </p:cxnSp>
+      <p:cxnSp>
+        <p:nvCxnSpPr>
+          <p:cNvPr id="26" name="Straight Connector 25">
+            <a:extLst>
+              <a:ext uri="{FF2B5EF4-FFF2-40B4-BE49-F238E27FC236}">
+                <a16:creationId xmlns:a16="http://schemas.microsoft.com/office/drawing/2014/main" id="{E47CB59F-27CA-48DC-84EF-6466A701DC42}"/>
+              </a:ext>
+            </a:extLst>
+          </p:cNvPr>
+          <p:cNvCxnSpPr>
+            <a:cxnSpLocks/>
+          </p:cNvCxnSpPr>
+          <p:nvPr/>
+        </p:nvCxnSpPr>
+        <p:spPr>
+          <a:xfrm flipH="1">
+            <a:off x="3477048" y="2286000"/>
+            <a:ext cx="2247900" cy="1"/>
+          </a:xfrm>
+          <a:prstGeom prst="line">
+            <a:avLst/>
+          </a:prstGeom>
+        </p:spPr>
+        <p:style>
+          <a:lnRef idx="1">
+            <a:schemeClr val="accent1"/>
+          </a:lnRef>
+          <a:fillRef idx="0">
+            <a:schemeClr val="accent1"/>
+          </a:fillRef>
+          <a:effectRef idx="0">
+            <a:schemeClr val="accent1"/>
+          </a:effectRef>
+          <a:fontRef idx="minor">
+            <a:schemeClr val="tx1"/>
+          </a:fontRef>
+        </p:style>
+      </p:cxnSp>
+      <p:sp>
+        <p:nvSpPr>
+          <p:cNvPr id="18" name="TextBox 17">
+            <a:extLst>
+              <a:ext uri="{FF2B5EF4-FFF2-40B4-BE49-F238E27FC236}">
+                <a16:creationId xmlns:a16="http://schemas.microsoft.com/office/drawing/2014/main" id="{4E10356C-3E35-4878-B544-1DAFADBB65ED}"/>
+              </a:ext>
+            </a:extLst>
+          </p:cNvPr>
+          <p:cNvSpPr txBox="1"/>
+          <p:nvPr/>
+        </p:nvSpPr>
+        <p:spPr>
+          <a:xfrm>
+            <a:off x="3502759" y="2125608"/>
+            <a:ext cx="473640" cy="338554"/>
+          </a:xfrm>
+          <a:prstGeom prst="rect">
+            <a:avLst/>
+          </a:prstGeom>
+          <a:solidFill>
+            <a:schemeClr val="bg1"/>
+          </a:solidFill>
+        </p:spPr>
+        <p:txBody>
+          <a:bodyPr wrap="square" rtlCol="0">
+            <a:spAutoFit/>
+          </a:bodyPr>
+          <a:lstStyle/>
+          <a:p>
+            <a:pPr algn="ctr"/>
+            <a:r>
+              <a:rPr lang="en-US" sz="1600" dirty="0">
+                <a:solidFill>
+                  <a:schemeClr val="accent1"/>
+                </a:solidFill>
+              </a:rPr>
+              <a:t>8m</a:t>
+            </a:r>
+          </a:p>
+        </p:txBody>
+      </p:sp>
+      <p:sp>
+        <p:nvSpPr>
+          <p:cNvPr id="29" name="TextBox 28">
+            <a:extLst>
+              <a:ext uri="{FF2B5EF4-FFF2-40B4-BE49-F238E27FC236}">
+                <a16:creationId xmlns:a16="http://schemas.microsoft.com/office/drawing/2014/main" id="{6BBD2B99-2FC3-4572-8E4A-D37FC3488284}"/>
+              </a:ext>
+            </a:extLst>
+          </p:cNvPr>
+          <p:cNvSpPr txBox="1"/>
+          <p:nvPr/>
+        </p:nvSpPr>
+        <p:spPr>
+          <a:xfrm>
+            <a:off x="4029498" y="2124075"/>
+            <a:ext cx="561949" cy="338554"/>
+          </a:xfrm>
+          <a:prstGeom prst="rect">
+            <a:avLst/>
+          </a:prstGeom>
+          <a:solidFill>
+            <a:schemeClr val="bg1"/>
+          </a:solidFill>
+        </p:spPr>
+        <p:txBody>
+          <a:bodyPr wrap="square" rtlCol="0">
+            <a:spAutoFit/>
+          </a:bodyPr>
+          <a:lstStyle/>
+          <a:p>
+            <a:pPr algn="ctr"/>
+            <a:r>
+              <a:rPr lang="en-US" sz="1600" dirty="0">
+                <a:solidFill>
+                  <a:schemeClr val="accent1"/>
+                </a:solidFill>
+              </a:rPr>
+              <a:t>12m</a:t>
+            </a:r>
+          </a:p>
+        </p:txBody>
+      </p:sp>
+      <p:sp>
+        <p:nvSpPr>
+          <p:cNvPr id="30" name="TextBox 29">
+            <a:extLst>
+              <a:ext uri="{FF2B5EF4-FFF2-40B4-BE49-F238E27FC236}">
+                <a16:creationId xmlns:a16="http://schemas.microsoft.com/office/drawing/2014/main" id="{7C69CB65-EE8A-47E6-A4DA-70F349DC6D94}"/>
+              </a:ext>
+            </a:extLst>
+          </p:cNvPr>
+          <p:cNvSpPr txBox="1"/>
+          <p:nvPr/>
+        </p:nvSpPr>
+        <p:spPr>
+          <a:xfrm>
+            <a:off x="4888291" y="2124075"/>
+            <a:ext cx="561949" cy="338554"/>
+          </a:xfrm>
+          <a:prstGeom prst="rect">
+            <a:avLst/>
+          </a:prstGeom>
+          <a:solidFill>
+            <a:schemeClr val="bg1"/>
+          </a:solidFill>
+        </p:spPr>
+        <p:txBody>
+          <a:bodyPr wrap="square" rtlCol="0">
+            <a:spAutoFit/>
+          </a:bodyPr>
+          <a:lstStyle/>
+          <a:p>
+            <a:pPr algn="ctr"/>
+            <a:r>
+              <a:rPr lang="en-US" sz="1600" dirty="0">
+                <a:solidFill>
+                  <a:schemeClr val="accent1"/>
+                </a:solidFill>
+              </a:rPr>
+              <a:t>20m</a:t>
+            </a:r>
+          </a:p>
+        </p:txBody>
+      </p:sp>
+      <p:cxnSp>
+        <p:nvCxnSpPr>
+          <p:cNvPr id="32" name="Straight Connector 31">
+            <a:extLst>
+              <a:ext uri="{FF2B5EF4-FFF2-40B4-BE49-F238E27FC236}">
+                <a16:creationId xmlns:a16="http://schemas.microsoft.com/office/drawing/2014/main" id="{B82DE590-6E4B-44ED-8D7F-E323D6FF828C}"/>
+              </a:ext>
+            </a:extLst>
+          </p:cNvPr>
+          <p:cNvCxnSpPr>
+            <a:cxnSpLocks/>
+          </p:cNvCxnSpPr>
+          <p:nvPr/>
+        </p:nvCxnSpPr>
+        <p:spPr>
+          <a:xfrm flipH="1" flipV="1">
+            <a:off x="3886623" y="4216638"/>
+            <a:ext cx="558746" cy="0"/>
+          </a:xfrm>
+          <a:prstGeom prst="line">
+            <a:avLst/>
+          </a:prstGeom>
+        </p:spPr>
+        <p:style>
+          <a:lnRef idx="1">
+            <a:schemeClr val="accent1"/>
+          </a:lnRef>
+          <a:fillRef idx="0">
+            <a:schemeClr val="accent1"/>
+          </a:fillRef>
+          <a:effectRef idx="0">
+            <a:schemeClr val="accent1"/>
+          </a:effectRef>
+          <a:fontRef idx="minor">
+            <a:schemeClr val="tx1"/>
+          </a:fontRef>
+        </p:style>
+      </p:cxnSp>
+      <p:cxnSp>
+        <p:nvCxnSpPr>
+          <p:cNvPr id="34" name="Straight Arrow Connector 33">
+            <a:extLst>
+              <a:ext uri="{FF2B5EF4-FFF2-40B4-BE49-F238E27FC236}">
+                <a16:creationId xmlns:a16="http://schemas.microsoft.com/office/drawing/2014/main" id="{592FF436-CFB3-46A7-8540-4ABDBFD5FF4D}"/>
+              </a:ext>
+            </a:extLst>
+          </p:cNvPr>
+          <p:cNvCxnSpPr>
+            <a:cxnSpLocks/>
+          </p:cNvCxnSpPr>
+          <p:nvPr/>
+        </p:nvCxnSpPr>
+        <p:spPr>
+          <a:xfrm>
+            <a:off x="4637609" y="5845774"/>
+            <a:ext cx="304800" cy="0"/>
+          </a:xfrm>
+          <a:prstGeom prst="straightConnector1">
+            <a:avLst/>
+          </a:prstGeom>
+          <a:ln>
+            <a:solidFill>
+              <a:srgbClr val="FF0000"/>
+            </a:solidFill>
+            <a:tailEnd type="arrow"/>
+          </a:ln>
+        </p:spPr>
+        <p:style>
+          <a:lnRef idx="3">
+            <a:schemeClr val="accent2"/>
+          </a:lnRef>
+          <a:fillRef idx="0">
+            <a:schemeClr val="accent2"/>
+          </a:fillRef>
+          <a:effectRef idx="2">
+            <a:schemeClr val="accent2"/>
+          </a:effectRef>
+          <a:fontRef idx="minor">
+            <a:schemeClr val="tx1"/>
+          </a:fontRef>
+        </p:style>
+      </p:cxnSp>
+      <p:sp>
+        <p:nvSpPr>
+          <p:cNvPr id="35" name="TextBox 34">
+            <a:extLst>
+              <a:ext uri="{FF2B5EF4-FFF2-40B4-BE49-F238E27FC236}">
+                <a16:creationId xmlns:a16="http://schemas.microsoft.com/office/drawing/2014/main" id="{EA07CFE6-194B-4793-AFE2-0416483D8B36}"/>
+              </a:ext>
+            </a:extLst>
+          </p:cNvPr>
+          <p:cNvSpPr txBox="1"/>
+          <p:nvPr/>
+        </p:nvSpPr>
+        <p:spPr>
+          <a:xfrm>
+            <a:off x="5174146" y="5650468"/>
+            <a:ext cx="617477" cy="369332"/>
+          </a:xfrm>
+          <a:prstGeom prst="rect">
+            <a:avLst/>
+          </a:prstGeom>
+          <a:noFill/>
+        </p:spPr>
+        <p:txBody>
+          <a:bodyPr wrap="none" rtlCol="0">
+            <a:spAutoFit/>
+          </a:bodyPr>
+          <a:lstStyle/>
+          <a:p>
+            <a:r>
+              <a:rPr lang="en-US" b="1" dirty="0">
+                <a:solidFill>
+                  <a:srgbClr val="FF0000"/>
+                </a:solidFill>
+              </a:rPr>
+              <a:t>8 kN</a:t>
+            </a:r>
+          </a:p>
+        </p:txBody>
+      </p:sp>
+      <p:cxnSp>
+        <p:nvCxnSpPr>
+          <p:cNvPr id="39" name="Straight Connector 38">
+            <a:extLst>
+              <a:ext uri="{FF2B5EF4-FFF2-40B4-BE49-F238E27FC236}">
+                <a16:creationId xmlns:a16="http://schemas.microsoft.com/office/drawing/2014/main" id="{D2BB89C5-4062-4A06-A8A2-54D1ED53EE99}"/>
+              </a:ext>
+            </a:extLst>
+          </p:cNvPr>
+          <p:cNvCxnSpPr>
+            <a:cxnSpLocks/>
+          </p:cNvCxnSpPr>
+          <p:nvPr/>
+        </p:nvCxnSpPr>
+        <p:spPr>
+          <a:xfrm flipH="1" flipV="1">
+            <a:off x="3886623" y="5829300"/>
+            <a:ext cx="558746" cy="0"/>
+          </a:xfrm>
+          <a:prstGeom prst="line">
+            <a:avLst/>
+          </a:prstGeom>
+        </p:spPr>
+        <p:style>
+          <a:lnRef idx="1">
+            <a:schemeClr val="accent1"/>
+          </a:lnRef>
+          <a:fillRef idx="0">
+            <a:schemeClr val="accent1"/>
+          </a:fillRef>
+          <a:effectRef idx="0">
+            <a:schemeClr val="accent1"/>
+          </a:effectRef>
+          <a:fontRef idx="minor">
+            <a:schemeClr val="tx1"/>
+          </a:fontRef>
+        </p:style>
+      </p:cxnSp>
+      <p:cxnSp>
+        <p:nvCxnSpPr>
+          <p:cNvPr id="40" name="Straight Connector 39">
+            <a:extLst>
+              <a:ext uri="{FF2B5EF4-FFF2-40B4-BE49-F238E27FC236}">
+                <a16:creationId xmlns:a16="http://schemas.microsoft.com/office/drawing/2014/main" id="{352F8B7D-7BFF-4A18-B321-D9D804C0612E}"/>
+              </a:ext>
+            </a:extLst>
+          </p:cNvPr>
+          <p:cNvCxnSpPr>
+            <a:cxnSpLocks/>
+          </p:cNvCxnSpPr>
+          <p:nvPr/>
+        </p:nvCxnSpPr>
+        <p:spPr>
+          <a:xfrm flipH="1" flipV="1">
+            <a:off x="4165996" y="4212772"/>
+            <a:ext cx="1" cy="1633002"/>
+          </a:xfrm>
+          <a:prstGeom prst="line">
+            <a:avLst/>
+          </a:prstGeom>
+        </p:spPr>
+        <p:style>
+          <a:lnRef idx="1">
+            <a:schemeClr val="accent1"/>
+          </a:lnRef>
+          <a:fillRef idx="0">
+            <a:schemeClr val="accent1"/>
+          </a:fillRef>
+          <a:effectRef idx="0">
+            <a:schemeClr val="accent1"/>
+          </a:effectRef>
+          <a:fontRef idx="minor">
+            <a:schemeClr val="tx1"/>
+          </a:fontRef>
+        </p:style>
+      </p:cxnSp>
+      <p:sp>
+        <p:nvSpPr>
+          <p:cNvPr id="43" name="TextBox 42">
+            <a:extLst>
+              <a:ext uri="{FF2B5EF4-FFF2-40B4-BE49-F238E27FC236}">
+                <a16:creationId xmlns:a16="http://schemas.microsoft.com/office/drawing/2014/main" id="{815158C2-45DD-4CEE-AE4E-7F784AAF5EC2}"/>
+              </a:ext>
+            </a:extLst>
+          </p:cNvPr>
+          <p:cNvSpPr txBox="1"/>
+          <p:nvPr/>
+        </p:nvSpPr>
+        <p:spPr>
+          <a:xfrm>
+            <a:off x="3886623" y="4859996"/>
+            <a:ext cx="561949" cy="338554"/>
+          </a:xfrm>
+          <a:prstGeom prst="rect">
+            <a:avLst/>
+          </a:prstGeom>
+          <a:solidFill>
+            <a:schemeClr val="bg1"/>
+          </a:solidFill>
+        </p:spPr>
+        <p:txBody>
+          <a:bodyPr wrap="square" rtlCol="0">
+            <a:spAutoFit/>
+          </a:bodyPr>
+          <a:lstStyle/>
+          <a:p>
+            <a:pPr algn="ctr"/>
+            <a:r>
+              <a:rPr lang="en-US" sz="1600" dirty="0">
+                <a:solidFill>
+                  <a:schemeClr val="accent1"/>
+                </a:solidFill>
+              </a:rPr>
+              <a:t>35m</a:t>
+            </a:r>
+          </a:p>
+        </p:txBody>
+      </p:sp>
+    </p:spTree>
+    <p:extLst>
+      <p:ext uri="{BB962C8B-B14F-4D97-AF65-F5344CB8AC3E}">
+        <p14:creationId xmlns:p14="http://schemas.microsoft.com/office/powerpoint/2010/main" val="4254025222"/>
       </p:ext>
     </p:extLst>
   </p:cSld>
@@ -5502,8 +8430,8 @@
           </a:fontRef>
         </p:style>
       </p:cxnSp>
-      <mc:AlternateContent xmlns:mc="http://schemas.openxmlformats.org/markup-compatibility/2006">
-        <mc:Choice xmlns:a14="http://schemas.microsoft.com/office/drawing/2010/main" Requires="a14">
+      <mc:AlternateContent xmlns:mc="http://schemas.openxmlformats.org/markup-compatibility/2006" xmlns:a14="http://schemas.microsoft.com/office/drawing/2010/main">
+        <mc:Choice Requires="a14">
           <p:sp>
             <p:nvSpPr>
               <p:cNvPr id="8" name="TextBox 7">
@@ -5668,7 +8596,7 @@
             </p:txBody>
           </p:sp>
         </mc:Choice>
-        <mc:Fallback>
+        <mc:Fallback xmlns="">
           <p:sp>
             <p:nvSpPr>
               <p:cNvPr id="8" name="TextBox 7">
@@ -5808,8 +8736,8 @@
           </a:p>
         </p:txBody>
       </p:sp>
-      <mc:AlternateContent xmlns:mc="http://schemas.openxmlformats.org/markup-compatibility/2006">
-        <mc:Choice xmlns:a14="http://schemas.microsoft.com/office/drawing/2010/main" Requires="a14">
+      <mc:AlternateContent xmlns:mc="http://schemas.openxmlformats.org/markup-compatibility/2006" xmlns:a14="http://schemas.microsoft.com/office/drawing/2010/main">
+        <mc:Choice Requires="a14">
           <p:sp>
             <p:nvSpPr>
               <p:cNvPr id="11" name="TextBox 10">
@@ -5974,7 +8902,7 @@
             </p:txBody>
           </p:sp>
         </mc:Choice>
-        <mc:Fallback>
+        <mc:Fallback xmlns="">
           <p:sp>
             <p:nvSpPr>
               <p:cNvPr id="11" name="TextBox 10">
@@ -6019,8 +8947,8 @@
           </p:sp>
         </mc:Fallback>
       </mc:AlternateContent>
-      <mc:AlternateContent xmlns:mc="http://schemas.openxmlformats.org/markup-compatibility/2006">
-        <mc:Choice xmlns:a14="http://schemas.microsoft.com/office/drawing/2010/main" Requires="a14">
+      <mc:AlternateContent xmlns:mc="http://schemas.openxmlformats.org/markup-compatibility/2006" xmlns:a14="http://schemas.microsoft.com/office/drawing/2010/main">
+        <mc:Choice Requires="a14">
           <p:sp>
             <p:nvSpPr>
               <p:cNvPr id="12" name="TextBox 11">
@@ -6185,7 +9113,7 @@
             </p:txBody>
           </p:sp>
         </mc:Choice>
-        <mc:Fallback>
+        <mc:Fallback xmlns="">
           <p:sp>
             <p:nvSpPr>
               <p:cNvPr id="12" name="TextBox 11">
@@ -13270,17 +16198,19 @@
         </p:nvSpPr>
         <p:spPr>
           <a:xfrm>
-            <a:off x="457200" y="1600201"/>
+            <a:off x="457200" y="1600994"/>
             <a:ext cx="8229600" cy="1524000"/>
           </a:xfrm>
         </p:spPr>
         <p:txBody>
-          <a:bodyPr/>
+          <a:bodyPr>
+            <a:normAutofit/>
+          </a:bodyPr>
           <a:lstStyle/>
           <a:p>
             <a:r>
               <a:rPr lang="en-US" dirty="0"/>
-              <a:t>Find the equivalent force couple system to the set of forces shown below about point A.</a:t>
+              <a:t>Find the equivalent force couple system about point A for the set of forces shown below.</a:t>
             </a:r>
           </a:p>
         </p:txBody>
@@ -13933,6 +16863,21 @@
 </file>
 
 <file path=customXml/item1.xml><?xml version="1.0" encoding="utf-8"?>
+<p:properties xmlns:p="http://schemas.microsoft.com/office/2006/metadata/properties" xmlns:xsi="http://www.w3.org/2001/XMLSchema-instance" xmlns:pc="http://schemas.microsoft.com/office/infopath/2007/PartnerControls">
+  <documentManagement/>
+</p:properties>
+</file>
+
+<file path=customXml/item2.xml><?xml version="1.0" encoding="utf-8"?>
+<?mso-contentType ?>
+<FormTemplates xmlns="http://schemas.microsoft.com/sharepoint/v3/contenttype/forms">
+  <Display>DocumentLibraryForm</Display>
+  <Edit>DocumentLibraryForm</Edit>
+  <New>DocumentLibraryForm</New>
+</FormTemplates>
+</file>
+
+<file path=customXml/item3.xml><?xml version="1.0" encoding="utf-8"?>
 <ct:contentTypeSchema xmlns:ct="http://schemas.microsoft.com/office/2006/metadata/contentType" xmlns:ma="http://schemas.microsoft.com/office/2006/metadata/properties/metaAttributes" ct:_="" ma:_="" ma:contentTypeName="Document" ma:contentTypeID="0x010100A06DF21F5BB2734A800ED30F3F452129" ma:contentTypeVersion="12" ma:contentTypeDescription="Create a new document." ma:contentTypeScope="" ma:versionID="544d96a5fbac5de9d5d902b535c73fb2">
   <xsd:schema xmlns:xsd="http://www.w3.org/2001/XMLSchema" xmlns:xs="http://www.w3.org/2001/XMLSchema" xmlns:p="http://schemas.microsoft.com/office/2006/metadata/properties" xmlns:ns3="90d05cb5-950f-4f68-bc2c-e17794455b92" xmlns:ns4="b4eab9fa-dbb0-4082-8491-8bd54207a265" targetNamespace="http://schemas.microsoft.com/office/2006/metadata/properties" ma:root="true" ma:fieldsID="7a710efc71c2169bf9c05e5a40dddf12" ns3:_="" ns4:_="">
     <xsd:import namespace="90d05cb5-950f-4f68-bc2c-e17794455b92"/>
@@ -14149,22 +17094,32 @@
 </ct:contentTypeSchema>
 </file>
 
-<file path=customXml/item2.xml><?xml version="1.0" encoding="utf-8"?>
-<?mso-contentType ?>
-<FormTemplates xmlns="http://schemas.microsoft.com/sharepoint/v3/contenttype/forms">
-  <Display>DocumentLibraryForm</Display>
-  <Edit>DocumentLibraryForm</Edit>
-  <New>DocumentLibraryForm</New>
-</FormTemplates>
+<file path=customXml/itemProps1.xml><?xml version="1.0" encoding="utf-8"?>
+<ds:datastoreItem xmlns:ds="http://schemas.openxmlformats.org/officeDocument/2006/customXml" ds:itemID="{52EB1464-66D1-425A-BBB5-7A9312BBE9C4}">
+  <ds:schemaRefs>
+    <ds:schemaRef ds:uri="http://purl.org/dc/terms/"/>
+    <ds:schemaRef ds:uri="http://schemas.openxmlformats.org/package/2006/metadata/core-properties"/>
+    <ds:schemaRef ds:uri="http://schemas.microsoft.com/office/2006/documentManagement/types"/>
+    <ds:schemaRef ds:uri="90d05cb5-950f-4f68-bc2c-e17794455b92"/>
+    <ds:schemaRef ds:uri="http://purl.org/dc/elements/1.1/"/>
+    <ds:schemaRef ds:uri="http://schemas.microsoft.com/office/2006/metadata/properties"/>
+    <ds:schemaRef ds:uri="http://schemas.microsoft.com/office/infopath/2007/PartnerControls"/>
+    <ds:schemaRef ds:uri="b4eab9fa-dbb0-4082-8491-8bd54207a265"/>
+    <ds:schemaRef ds:uri="http://www.w3.org/XML/1998/namespace"/>
+    <ds:schemaRef ds:uri="http://purl.org/dc/dcmitype/"/>
+  </ds:schemaRefs>
+</ds:datastoreItem>
 </file>
 
-<file path=customXml/item3.xml><?xml version="1.0" encoding="utf-8"?>
-<p:properties xmlns:p="http://schemas.microsoft.com/office/2006/metadata/properties" xmlns:xsi="http://www.w3.org/2001/XMLSchema-instance" xmlns:pc="http://schemas.microsoft.com/office/infopath/2007/PartnerControls">
-  <documentManagement/>
-</p:properties>
+<file path=customXml/itemProps2.xml><?xml version="1.0" encoding="utf-8"?>
+<ds:datastoreItem xmlns:ds="http://schemas.openxmlformats.org/officeDocument/2006/customXml" ds:itemID="{F5CF5F32-56DC-4068-8B04-457CF34A96F3}">
+  <ds:schemaRefs>
+    <ds:schemaRef ds:uri="http://schemas.microsoft.com/sharepoint/v3/contenttype/forms"/>
+  </ds:schemaRefs>
+</ds:datastoreItem>
 </file>
 
-<file path=customXml/itemProps1.xml><?xml version="1.0" encoding="utf-8"?>
+<file path=customXml/itemProps3.xml><?xml version="1.0" encoding="utf-8"?>
 <ds:datastoreItem xmlns:ds="http://schemas.openxmlformats.org/officeDocument/2006/customXml" ds:itemID="{A43B8A4B-79FE-4529-931C-D64224FA70E3}">
   <ds:schemaRefs>
     <ds:schemaRef ds:uri="http://schemas.microsoft.com/office/2006/metadata/contentType"/>
@@ -14181,29 +17136,4 @@
     <ds:schemaRef ds:uri="http://schemas.microsoft.com/internal/obd"/>
   </ds:schemaRefs>
 </ds:datastoreItem>
-</file>
-
-<file path=customXml/itemProps2.xml><?xml version="1.0" encoding="utf-8"?>
-<ds:datastoreItem xmlns:ds="http://schemas.openxmlformats.org/officeDocument/2006/customXml" ds:itemID="{F5CF5F32-56DC-4068-8B04-457CF34A96F3}">
-  <ds:schemaRefs>
-    <ds:schemaRef ds:uri="http://schemas.microsoft.com/sharepoint/v3/contenttype/forms"/>
-  </ds:schemaRefs>
-</ds:datastoreItem>
-</file>
-
-<file path=customXml/itemProps3.xml><?xml version="1.0" encoding="utf-8"?>
-<ds:datastoreItem xmlns:ds="http://schemas.openxmlformats.org/officeDocument/2006/customXml" ds:itemID="{52EB1464-66D1-425A-BBB5-7A9312BBE9C4}">
-  <ds:schemaRefs>
-    <ds:schemaRef ds:uri="http://purl.org/dc/terms/"/>
-    <ds:schemaRef ds:uri="http://schemas.openxmlformats.org/package/2006/metadata/core-properties"/>
-    <ds:schemaRef ds:uri="http://schemas.microsoft.com/office/2006/documentManagement/types"/>
-    <ds:schemaRef ds:uri="90d05cb5-950f-4f68-bc2c-e17794455b92"/>
-    <ds:schemaRef ds:uri="http://purl.org/dc/elements/1.1/"/>
-    <ds:schemaRef ds:uri="http://schemas.microsoft.com/office/2006/metadata/properties"/>
-    <ds:schemaRef ds:uri="http://schemas.microsoft.com/office/infopath/2007/PartnerControls"/>
-    <ds:schemaRef ds:uri="b4eab9fa-dbb0-4082-8491-8bd54207a265"/>
-    <ds:schemaRef ds:uri="http://www.w3.org/XML/1998/namespace"/>
-    <ds:schemaRef ds:uri="http://purl.org/dc/dcmitype/"/>
-  </ds:schemaRefs>
-</ds:datastoreItem>
 </file>
</xml_diff>